<commit_message>
Added source field in template
</commit_message>
<xml_diff>
--- a/talkgenerator/data/powerpoint/template.pptx
+++ b/talkgenerator/data/powerpoint/template.pptx
@@ -197,7 +197,7 @@
           <a:p>
             <a:fld id="{FEE386D4-E0F5-48ED-B382-C5D6AB88A5B0}" type="datetimeFigureOut">
               <a:rPr lang="en-GB" smtClean="0"/>
-              <a:t>04/09/2018</a:t>
+              <a:t>06/03/2020</a:t>
             </a:fld>
             <a:endParaRPr lang="en-GB"/>
           </a:p>
@@ -356,7 +356,7 @@
           <a:p>
             <a:fld id="{1CBEF53D-F467-4724-8C38-3F4795731E32}" type="slidenum">
               <a:rPr lang="en-GB" smtClean="0"/>
-              <a:t>‹nr.›</a:t>
+              <a:t>‹#›</a:t>
             </a:fld>
             <a:endParaRPr lang="en-GB"/>
           </a:p>
@@ -5220,7 +5220,7 @@
           <a:p>
             <a:fld id="{1F469EBC-A649-4E3E-8046-4745AB923F3E}" type="slidenum">
               <a:rPr lang="en-GB" smtClean="0"/>
-              <a:t>‹nr.›</a:t>
+              <a:t>‹#›</a:t>
             </a:fld>
             <a:endParaRPr lang="en-GB"/>
           </a:p>
@@ -5306,8 +5306,8 @@
         </p:nvSpPr>
         <p:spPr>
           <a:xfrm>
-            <a:off x="838200" y="1354974"/>
-            <a:ext cx="10515600" cy="5411585"/>
+            <a:off x="838200" y="1354975"/>
+            <a:ext cx="10515600" cy="5162204"/>
           </a:xfrm>
           <a:prstGeom prst="rect">
             <a:avLst/>
@@ -5397,9 +5397,252 @@
             <a:pPr lvl="0"/>
             <a:fld id="{D3555157-950B-4007-A6E1-787135ACA693}" type="slidenum">
               <a:rPr lang="en-GB" smtClean="0"/>
-              <a:t>‹nr.›</a:t>
+              <a:t>‹#›</a:t>
             </a:fld>
             <a:endParaRPr lang="en-GB" dirty="0"/>
+          </a:p>
+        </p:txBody>
+      </p:sp>
+      <p:sp>
+        <p:nvSpPr>
+          <p:cNvPr id="5" name="Text Placeholder 2">
+            <a:extLst>
+              <a:ext uri="{FF2B5EF4-FFF2-40B4-BE49-F238E27FC236}">
+                <a16:creationId xmlns:a16="http://schemas.microsoft.com/office/drawing/2014/main" id="{24B759E9-C42E-4583-8FA1-4555068DAA5D}"/>
+              </a:ext>
+            </a:extLst>
+          </p:cNvPr>
+          <p:cNvSpPr txBox="1">
+            <a:spLocks/>
+          </p:cNvSpPr>
+          <p:nvPr userDrawn="1"/>
+        </p:nvSpPr>
+        <p:spPr>
+          <a:xfrm>
+            <a:off x="42389" y="6604906"/>
+            <a:ext cx="11311411" cy="165365"/>
+          </a:xfrm>
+          <a:prstGeom prst="rect">
+            <a:avLst/>
+          </a:prstGeom>
+        </p:spPr>
+        <p:txBody>
+          <a:bodyPr vert="horz" lIns="91440" tIns="45720" rIns="91440" bIns="45720" rtlCol="0">
+            <a:noAutofit/>
+          </a:bodyPr>
+          <a:lstStyle>
+            <a:lvl1pPr marL="228600" indent="-228600" algn="l" defTabSz="914400" rtl="0" eaLnBrk="1" latinLnBrk="0" hangingPunct="1">
+              <a:lnSpc>
+                <a:spcPct val="90000"/>
+              </a:lnSpc>
+              <a:spcBef>
+                <a:spcPts val="1000"/>
+              </a:spcBef>
+              <a:buFont typeface="Arial" panose="020B0604020202020204" pitchFamily="34" charset="0"/>
+              <a:buChar char="•"/>
+              <a:defRPr sz="3200" kern="1200">
+                <a:solidFill>
+                  <a:schemeClr val="tx1"/>
+                </a:solidFill>
+                <a:effectLst>
+                  <a:outerShdw blurRad="38100" dist="38100" dir="2700000" algn="tl">
+                    <a:srgbClr val="000000">
+                      <a:alpha val="43137"/>
+                    </a:srgbClr>
+                  </a:outerShdw>
+                </a:effectLst>
+                <a:latin typeface="+mn-lt"/>
+                <a:ea typeface="+mn-ea"/>
+                <a:cs typeface="+mn-cs"/>
+              </a:defRPr>
+            </a:lvl1pPr>
+            <a:lvl2pPr marL="685800" indent="-228600" algn="l" defTabSz="914400" rtl="0" eaLnBrk="1" latinLnBrk="0" hangingPunct="1">
+              <a:lnSpc>
+                <a:spcPct val="90000"/>
+              </a:lnSpc>
+              <a:spcBef>
+                <a:spcPts val="500"/>
+              </a:spcBef>
+              <a:buFont typeface="Arial" panose="020B0604020202020204" pitchFamily="34" charset="0"/>
+              <a:buChar char="•"/>
+              <a:defRPr sz="2800" kern="1200">
+                <a:solidFill>
+                  <a:schemeClr val="tx1"/>
+                </a:solidFill>
+                <a:effectLst>
+                  <a:outerShdw blurRad="38100" dist="38100" dir="2700000" algn="tl">
+                    <a:srgbClr val="000000">
+                      <a:alpha val="43137"/>
+                    </a:srgbClr>
+                  </a:outerShdw>
+                </a:effectLst>
+                <a:latin typeface="+mn-lt"/>
+                <a:ea typeface="+mn-ea"/>
+                <a:cs typeface="+mn-cs"/>
+              </a:defRPr>
+            </a:lvl2pPr>
+            <a:lvl3pPr marL="1143000" indent="-228600" algn="l" defTabSz="914400" rtl="0" eaLnBrk="1" latinLnBrk="0" hangingPunct="1">
+              <a:lnSpc>
+                <a:spcPct val="90000"/>
+              </a:lnSpc>
+              <a:spcBef>
+                <a:spcPts val="500"/>
+              </a:spcBef>
+              <a:buFont typeface="Arial" panose="020B0604020202020204" pitchFamily="34" charset="0"/>
+              <a:buChar char="•"/>
+              <a:defRPr sz="2400" kern="1200">
+                <a:solidFill>
+                  <a:schemeClr val="tx1"/>
+                </a:solidFill>
+                <a:effectLst>
+                  <a:outerShdw blurRad="38100" dist="38100" dir="2700000" algn="tl">
+                    <a:srgbClr val="000000">
+                      <a:alpha val="43137"/>
+                    </a:srgbClr>
+                  </a:outerShdw>
+                </a:effectLst>
+                <a:latin typeface="+mn-lt"/>
+                <a:ea typeface="+mn-ea"/>
+                <a:cs typeface="+mn-cs"/>
+              </a:defRPr>
+            </a:lvl3pPr>
+            <a:lvl4pPr marL="1600200" indent="-228600" algn="l" defTabSz="914400" rtl="0" eaLnBrk="1" latinLnBrk="0" hangingPunct="1">
+              <a:lnSpc>
+                <a:spcPct val="90000"/>
+              </a:lnSpc>
+              <a:spcBef>
+                <a:spcPts val="500"/>
+              </a:spcBef>
+              <a:buFont typeface="Arial" panose="020B0604020202020204" pitchFamily="34" charset="0"/>
+              <a:buChar char="•"/>
+              <a:defRPr sz="2000" kern="1200">
+                <a:solidFill>
+                  <a:schemeClr val="tx1"/>
+                </a:solidFill>
+                <a:effectLst>
+                  <a:outerShdw blurRad="38100" dist="38100" dir="2700000" algn="tl">
+                    <a:srgbClr val="000000">
+                      <a:alpha val="43137"/>
+                    </a:srgbClr>
+                  </a:outerShdw>
+                </a:effectLst>
+                <a:latin typeface="+mn-lt"/>
+                <a:ea typeface="+mn-ea"/>
+                <a:cs typeface="+mn-cs"/>
+              </a:defRPr>
+            </a:lvl4pPr>
+            <a:lvl5pPr marL="2057400" indent="-228600" algn="l" defTabSz="914400" rtl="0" eaLnBrk="1" latinLnBrk="0" hangingPunct="1">
+              <a:lnSpc>
+                <a:spcPct val="90000"/>
+              </a:lnSpc>
+              <a:spcBef>
+                <a:spcPts val="500"/>
+              </a:spcBef>
+              <a:buFont typeface="Arial" panose="020B0604020202020204" pitchFamily="34" charset="0"/>
+              <a:buChar char="•"/>
+              <a:defRPr sz="2000" kern="1200">
+                <a:solidFill>
+                  <a:schemeClr val="tx1"/>
+                </a:solidFill>
+                <a:effectLst>
+                  <a:outerShdw blurRad="38100" dist="38100" dir="2700000" algn="tl">
+                    <a:srgbClr val="000000">
+                      <a:alpha val="43137"/>
+                    </a:srgbClr>
+                  </a:outerShdw>
+                </a:effectLst>
+                <a:latin typeface="+mn-lt"/>
+                <a:ea typeface="+mn-ea"/>
+                <a:cs typeface="+mn-cs"/>
+              </a:defRPr>
+            </a:lvl5pPr>
+            <a:lvl6pPr marL="2514600" indent="-228600" algn="l" defTabSz="914400" rtl="0" eaLnBrk="1" latinLnBrk="0" hangingPunct="1">
+              <a:lnSpc>
+                <a:spcPct val="90000"/>
+              </a:lnSpc>
+              <a:spcBef>
+                <a:spcPts val="500"/>
+              </a:spcBef>
+              <a:buFont typeface="Arial" panose="020B0604020202020204" pitchFamily="34" charset="0"/>
+              <a:buChar char="•"/>
+              <a:defRPr sz="1800" kern="1200">
+                <a:solidFill>
+                  <a:schemeClr val="tx1"/>
+                </a:solidFill>
+                <a:latin typeface="+mn-lt"/>
+                <a:ea typeface="+mn-ea"/>
+                <a:cs typeface="+mn-cs"/>
+              </a:defRPr>
+            </a:lvl6pPr>
+            <a:lvl7pPr marL="2971800" indent="-228600" algn="l" defTabSz="914400" rtl="0" eaLnBrk="1" latinLnBrk="0" hangingPunct="1">
+              <a:lnSpc>
+                <a:spcPct val="90000"/>
+              </a:lnSpc>
+              <a:spcBef>
+                <a:spcPts val="500"/>
+              </a:spcBef>
+              <a:buFont typeface="Arial" panose="020B0604020202020204" pitchFamily="34" charset="0"/>
+              <a:buChar char="•"/>
+              <a:defRPr sz="1800" kern="1200">
+                <a:solidFill>
+                  <a:schemeClr val="tx1"/>
+                </a:solidFill>
+                <a:latin typeface="+mn-lt"/>
+                <a:ea typeface="+mn-ea"/>
+                <a:cs typeface="+mn-cs"/>
+              </a:defRPr>
+            </a:lvl7pPr>
+            <a:lvl8pPr marL="3429000" indent="-228600" algn="l" defTabSz="914400" rtl="0" eaLnBrk="1" latinLnBrk="0" hangingPunct="1">
+              <a:lnSpc>
+                <a:spcPct val="90000"/>
+              </a:lnSpc>
+              <a:spcBef>
+                <a:spcPts val="500"/>
+              </a:spcBef>
+              <a:buFont typeface="Arial" panose="020B0604020202020204" pitchFamily="34" charset="0"/>
+              <a:buChar char="•"/>
+              <a:defRPr sz="1800" kern="1200">
+                <a:solidFill>
+                  <a:schemeClr val="tx1"/>
+                </a:solidFill>
+                <a:latin typeface="+mn-lt"/>
+                <a:ea typeface="+mn-ea"/>
+                <a:cs typeface="+mn-cs"/>
+              </a:defRPr>
+            </a:lvl8pPr>
+            <a:lvl9pPr marL="3886200" indent="-228600" algn="l" defTabSz="914400" rtl="0" eaLnBrk="1" latinLnBrk="0" hangingPunct="1">
+              <a:lnSpc>
+                <a:spcPct val="90000"/>
+              </a:lnSpc>
+              <a:spcBef>
+                <a:spcPts val="500"/>
+              </a:spcBef>
+              <a:buFont typeface="Arial" panose="020B0604020202020204" pitchFamily="34" charset="0"/>
+              <a:buChar char="•"/>
+              <a:defRPr sz="1800" kern="1200">
+                <a:solidFill>
+                  <a:schemeClr val="tx1"/>
+                </a:solidFill>
+                <a:latin typeface="+mn-lt"/>
+                <a:ea typeface="+mn-ea"/>
+                <a:cs typeface="+mn-cs"/>
+              </a:defRPr>
+            </a:lvl9pPr>
+          </a:lstStyle>
+          <a:p>
+            <a:pPr marL="0" indent="0">
+              <a:buNone/>
+            </a:pPr>
+            <a:r>
+              <a:rPr lang="en-US" sz="800" i="1" dirty="0">
+                <a:solidFill>
+                  <a:schemeClr val="tx1">
+                    <a:lumMod val="50000"/>
+                  </a:schemeClr>
+                </a:solidFill>
+              </a:rPr>
+              <a:t>Sources:</a:t>
+            </a:r>
           </a:p>
         </p:txBody>
       </p:sp>

</xml_diff>

<commit_message>
Added way of adding sources
</commit_message>
<xml_diff>
--- a/talkgenerator/data/powerpoint/template.pptx
+++ b/talkgenerator/data/powerpoint/template.pptx
@@ -197,7 +197,7 @@
           <a:p>
             <a:fld id="{FEE386D4-E0F5-48ED-B382-C5D6AB88A5B0}" type="datetimeFigureOut">
               <a:rPr lang="en-GB" smtClean="0"/>
-              <a:t>06/03/2020</a:t>
+              <a:t>07/03/2020</a:t>
             </a:fld>
             <a:endParaRPr lang="en-GB"/>
           </a:p>
@@ -466,7 +466,7 @@
 </file>
 
 <file path=ppt/slideLayouts/slideLayout1.xml><?xml version="1.0" encoding="utf-8"?>
-<p:sldLayout xmlns:a="http://schemas.openxmlformats.org/drawingml/2006/main" xmlns:r="http://schemas.openxmlformats.org/officeDocument/2006/relationships" xmlns:p="http://schemas.openxmlformats.org/presentationml/2006/main" type="title" preserve="1">
+<p:sldLayout xmlns:a="http://schemas.openxmlformats.org/drawingml/2006/main" xmlns:r="http://schemas.openxmlformats.org/officeDocument/2006/relationships" xmlns:p="http://schemas.openxmlformats.org/presentationml/2006/main" preserve="1" userDrawn="1">
   <p:cSld name="Titeldia">
     <p:spTree>
       <p:nvGrpSpPr>
@@ -589,6 +589,94 @@
           </a:p>
         </p:txBody>
       </p:sp>
+      <p:sp>
+        <p:nvSpPr>
+          <p:cNvPr id="7" name="Content Placeholder 5">
+            <a:extLst>
+              <a:ext uri="{FF2B5EF4-FFF2-40B4-BE49-F238E27FC236}">
+                <a16:creationId xmlns:a16="http://schemas.microsoft.com/office/drawing/2014/main" id="{B97890E8-CAC0-4003-BC10-DAC87A783C76}"/>
+              </a:ext>
+            </a:extLst>
+          </p:cNvPr>
+          <p:cNvSpPr>
+            <a:spLocks noGrp="1"/>
+          </p:cNvSpPr>
+          <p:nvPr>
+            <p:ph sz="quarter" idx="10"/>
+          </p:nvPr>
+        </p:nvSpPr>
+        <p:spPr>
+          <a:xfrm>
+            <a:off x="0" y="6591993"/>
+            <a:ext cx="12192000" cy="266008"/>
+          </a:xfrm>
+        </p:spPr>
+        <p:txBody>
+          <a:bodyPr>
+            <a:noAutofit/>
+          </a:bodyPr>
+          <a:lstStyle>
+            <a:lvl1pPr marL="0" indent="0">
+              <a:buNone/>
+              <a:defRPr sz="1100">
+                <a:solidFill>
+                  <a:schemeClr val="tx1">
+                    <a:lumMod val="50000"/>
+                  </a:schemeClr>
+                </a:solidFill>
+              </a:defRPr>
+            </a:lvl1pPr>
+            <a:lvl2pPr marL="457200" indent="0">
+              <a:buNone/>
+              <a:defRPr sz="1000">
+                <a:solidFill>
+                  <a:schemeClr val="tx1">
+                    <a:lumMod val="50000"/>
+                  </a:schemeClr>
+                </a:solidFill>
+              </a:defRPr>
+            </a:lvl2pPr>
+            <a:lvl3pPr marL="914400" indent="0">
+              <a:buNone/>
+              <a:defRPr sz="1000">
+                <a:solidFill>
+                  <a:schemeClr val="tx1">
+                    <a:lumMod val="50000"/>
+                  </a:schemeClr>
+                </a:solidFill>
+              </a:defRPr>
+            </a:lvl3pPr>
+            <a:lvl4pPr marL="1371600" indent="0">
+              <a:buNone/>
+              <a:defRPr sz="1000">
+                <a:solidFill>
+                  <a:schemeClr val="tx1">
+                    <a:lumMod val="50000"/>
+                  </a:schemeClr>
+                </a:solidFill>
+              </a:defRPr>
+            </a:lvl4pPr>
+            <a:lvl5pPr marL="1828800" indent="0">
+              <a:buNone/>
+              <a:defRPr sz="1000">
+                <a:solidFill>
+                  <a:schemeClr val="tx1">
+                    <a:lumMod val="50000"/>
+                  </a:schemeClr>
+                </a:solidFill>
+              </a:defRPr>
+            </a:lvl5pPr>
+          </a:lstStyle>
+          <a:p>
+            <a:pPr lvl="0"/>
+            <a:r>
+              <a:rPr lang="en-US" dirty="0"/>
+              <a:t>Click to edit Master text styles</a:t>
+            </a:r>
+            <a:endParaRPr lang="en-BE" dirty="0"/>
+          </a:p>
+        </p:txBody>
+      </p:sp>
     </p:spTree>
     <p:extLst>
       <p:ext uri="{BB962C8B-B14F-4D97-AF65-F5344CB8AC3E}">
@@ -603,7 +691,7 @@
 </file>
 
 <file path=ppt/slideLayouts/slideLayout10.xml><?xml version="1.0" encoding="utf-8"?>
-<p:sldLayout xmlns:a="http://schemas.openxmlformats.org/drawingml/2006/main" xmlns:r="http://schemas.openxmlformats.org/officeDocument/2006/relationships" xmlns:p="http://schemas.openxmlformats.org/presentationml/2006/main" type="vertTx" preserve="1">
+<p:sldLayout xmlns:a="http://schemas.openxmlformats.org/drawingml/2006/main" xmlns:r="http://schemas.openxmlformats.org/officeDocument/2006/relationships" xmlns:p="http://schemas.openxmlformats.org/presentationml/2006/main" preserve="1" userDrawn="1">
   <p:cSld name="Titel en verticale tekst">
     <p:spTree>
       <p:nvGrpSpPr>
@@ -694,6 +782,94 @@
           </a:p>
         </p:txBody>
       </p:sp>
+      <p:sp>
+        <p:nvSpPr>
+          <p:cNvPr id="4" name="Content Placeholder 5">
+            <a:extLst>
+              <a:ext uri="{FF2B5EF4-FFF2-40B4-BE49-F238E27FC236}">
+                <a16:creationId xmlns:a16="http://schemas.microsoft.com/office/drawing/2014/main" id="{F9C8707F-6414-4775-A773-5EB293D1650E}"/>
+              </a:ext>
+            </a:extLst>
+          </p:cNvPr>
+          <p:cNvSpPr>
+            <a:spLocks noGrp="1"/>
+          </p:cNvSpPr>
+          <p:nvPr>
+            <p:ph sz="quarter" idx="10"/>
+          </p:nvPr>
+        </p:nvSpPr>
+        <p:spPr>
+          <a:xfrm>
+            <a:off x="0" y="6591993"/>
+            <a:ext cx="12192000" cy="266008"/>
+          </a:xfrm>
+        </p:spPr>
+        <p:txBody>
+          <a:bodyPr>
+            <a:noAutofit/>
+          </a:bodyPr>
+          <a:lstStyle>
+            <a:lvl1pPr marL="0" indent="0">
+              <a:buNone/>
+              <a:defRPr sz="1100">
+                <a:solidFill>
+                  <a:schemeClr val="tx1">
+                    <a:lumMod val="50000"/>
+                  </a:schemeClr>
+                </a:solidFill>
+              </a:defRPr>
+            </a:lvl1pPr>
+            <a:lvl2pPr marL="457200" indent="0">
+              <a:buNone/>
+              <a:defRPr sz="1000">
+                <a:solidFill>
+                  <a:schemeClr val="tx1">
+                    <a:lumMod val="50000"/>
+                  </a:schemeClr>
+                </a:solidFill>
+              </a:defRPr>
+            </a:lvl2pPr>
+            <a:lvl3pPr marL="914400" indent="0">
+              <a:buNone/>
+              <a:defRPr sz="1000">
+                <a:solidFill>
+                  <a:schemeClr val="tx1">
+                    <a:lumMod val="50000"/>
+                  </a:schemeClr>
+                </a:solidFill>
+              </a:defRPr>
+            </a:lvl3pPr>
+            <a:lvl4pPr marL="1371600" indent="0">
+              <a:buNone/>
+              <a:defRPr sz="1000">
+                <a:solidFill>
+                  <a:schemeClr val="tx1">
+                    <a:lumMod val="50000"/>
+                  </a:schemeClr>
+                </a:solidFill>
+              </a:defRPr>
+            </a:lvl4pPr>
+            <a:lvl5pPr marL="1828800" indent="0">
+              <a:buNone/>
+              <a:defRPr sz="1000">
+                <a:solidFill>
+                  <a:schemeClr val="tx1">
+                    <a:lumMod val="50000"/>
+                  </a:schemeClr>
+                </a:solidFill>
+              </a:defRPr>
+            </a:lvl5pPr>
+          </a:lstStyle>
+          <a:p>
+            <a:pPr lvl="0"/>
+            <a:r>
+              <a:rPr lang="en-US" dirty="0"/>
+              <a:t>Click to edit Master text styles</a:t>
+            </a:r>
+            <a:endParaRPr lang="en-BE" dirty="0"/>
+          </a:p>
+        </p:txBody>
+      </p:sp>
     </p:spTree>
     <p:extLst>
       <p:ext uri="{BB962C8B-B14F-4D97-AF65-F5344CB8AC3E}">
@@ -708,7 +884,7 @@
 </file>
 
 <file path=ppt/slideLayouts/slideLayout11.xml><?xml version="1.0" encoding="utf-8"?>
-<p:sldLayout xmlns:a="http://schemas.openxmlformats.org/drawingml/2006/main" xmlns:r="http://schemas.openxmlformats.org/officeDocument/2006/relationships" xmlns:p="http://schemas.openxmlformats.org/presentationml/2006/main" type="vertTitleAndTx" preserve="1">
+<p:sldLayout xmlns:a="http://schemas.openxmlformats.org/drawingml/2006/main" xmlns:r="http://schemas.openxmlformats.org/officeDocument/2006/relationships" xmlns:p="http://schemas.openxmlformats.org/presentationml/2006/main" preserve="1" userDrawn="1">
   <p:cSld name="Verticale titel en tekst">
     <p:spTree>
       <p:nvGrpSpPr>
@@ -806,6 +982,94 @@
               <a:t>Vijfde niveau</a:t>
             </a:r>
             <a:endParaRPr lang="en-US" dirty="0"/>
+          </a:p>
+        </p:txBody>
+      </p:sp>
+      <p:sp>
+        <p:nvSpPr>
+          <p:cNvPr id="4" name="Content Placeholder 5">
+            <a:extLst>
+              <a:ext uri="{FF2B5EF4-FFF2-40B4-BE49-F238E27FC236}">
+                <a16:creationId xmlns:a16="http://schemas.microsoft.com/office/drawing/2014/main" id="{8CA1863E-BFAC-48A6-A88A-03112240D383}"/>
+              </a:ext>
+            </a:extLst>
+          </p:cNvPr>
+          <p:cNvSpPr>
+            <a:spLocks noGrp="1"/>
+          </p:cNvSpPr>
+          <p:nvPr>
+            <p:ph sz="quarter" idx="10"/>
+          </p:nvPr>
+        </p:nvSpPr>
+        <p:spPr>
+          <a:xfrm>
+            <a:off x="0" y="6591993"/>
+            <a:ext cx="12192000" cy="266008"/>
+          </a:xfrm>
+        </p:spPr>
+        <p:txBody>
+          <a:bodyPr>
+            <a:noAutofit/>
+          </a:bodyPr>
+          <a:lstStyle>
+            <a:lvl1pPr marL="0" indent="0">
+              <a:buNone/>
+              <a:defRPr sz="1100">
+                <a:solidFill>
+                  <a:schemeClr val="tx1">
+                    <a:lumMod val="50000"/>
+                  </a:schemeClr>
+                </a:solidFill>
+              </a:defRPr>
+            </a:lvl1pPr>
+            <a:lvl2pPr marL="457200" indent="0">
+              <a:buNone/>
+              <a:defRPr sz="1000">
+                <a:solidFill>
+                  <a:schemeClr val="tx1">
+                    <a:lumMod val="50000"/>
+                  </a:schemeClr>
+                </a:solidFill>
+              </a:defRPr>
+            </a:lvl2pPr>
+            <a:lvl3pPr marL="914400" indent="0">
+              <a:buNone/>
+              <a:defRPr sz="1000">
+                <a:solidFill>
+                  <a:schemeClr val="tx1">
+                    <a:lumMod val="50000"/>
+                  </a:schemeClr>
+                </a:solidFill>
+              </a:defRPr>
+            </a:lvl3pPr>
+            <a:lvl4pPr marL="1371600" indent="0">
+              <a:buNone/>
+              <a:defRPr sz="1000">
+                <a:solidFill>
+                  <a:schemeClr val="tx1">
+                    <a:lumMod val="50000"/>
+                  </a:schemeClr>
+                </a:solidFill>
+              </a:defRPr>
+            </a:lvl4pPr>
+            <a:lvl5pPr marL="1828800" indent="0">
+              <a:buNone/>
+              <a:defRPr sz="1000">
+                <a:solidFill>
+                  <a:schemeClr val="tx1">
+                    <a:lumMod val="50000"/>
+                  </a:schemeClr>
+                </a:solidFill>
+              </a:defRPr>
+            </a:lvl5pPr>
+          </a:lstStyle>
+          <a:p>
+            <a:pPr lvl="0"/>
+            <a:r>
+              <a:rPr lang="en-US" dirty="0"/>
+              <a:t>Click to edit Master text styles</a:t>
+            </a:r>
+            <a:endParaRPr lang="en-BE" dirty="0"/>
           </a:p>
         </p:txBody>
       </p:sp>
@@ -933,6 +1197,94 @@
           </a:p>
         </p:txBody>
       </p:sp>
+      <p:sp>
+        <p:nvSpPr>
+          <p:cNvPr id="4" name="Content Placeholder 5">
+            <a:extLst>
+              <a:ext uri="{FF2B5EF4-FFF2-40B4-BE49-F238E27FC236}">
+                <a16:creationId xmlns:a16="http://schemas.microsoft.com/office/drawing/2014/main" id="{583EB18E-6C08-446D-8C97-90A23AD198A0}"/>
+              </a:ext>
+            </a:extLst>
+          </p:cNvPr>
+          <p:cNvSpPr>
+            <a:spLocks noGrp="1"/>
+          </p:cNvSpPr>
+          <p:nvPr>
+            <p:ph sz="quarter" idx="10"/>
+          </p:nvPr>
+        </p:nvSpPr>
+        <p:spPr>
+          <a:xfrm>
+            <a:off x="0" y="6591993"/>
+            <a:ext cx="12192000" cy="266008"/>
+          </a:xfrm>
+        </p:spPr>
+        <p:txBody>
+          <a:bodyPr>
+            <a:noAutofit/>
+          </a:bodyPr>
+          <a:lstStyle>
+            <a:lvl1pPr marL="0" indent="0">
+              <a:buNone/>
+              <a:defRPr sz="1100">
+                <a:solidFill>
+                  <a:schemeClr val="tx1">
+                    <a:lumMod val="50000"/>
+                  </a:schemeClr>
+                </a:solidFill>
+              </a:defRPr>
+            </a:lvl1pPr>
+            <a:lvl2pPr marL="457200" indent="0">
+              <a:buNone/>
+              <a:defRPr sz="1000">
+                <a:solidFill>
+                  <a:schemeClr val="tx1">
+                    <a:lumMod val="50000"/>
+                  </a:schemeClr>
+                </a:solidFill>
+              </a:defRPr>
+            </a:lvl2pPr>
+            <a:lvl3pPr marL="914400" indent="0">
+              <a:buNone/>
+              <a:defRPr sz="1000">
+                <a:solidFill>
+                  <a:schemeClr val="tx1">
+                    <a:lumMod val="50000"/>
+                  </a:schemeClr>
+                </a:solidFill>
+              </a:defRPr>
+            </a:lvl3pPr>
+            <a:lvl4pPr marL="1371600" indent="0">
+              <a:buNone/>
+              <a:defRPr sz="1000">
+                <a:solidFill>
+                  <a:schemeClr val="tx1">
+                    <a:lumMod val="50000"/>
+                  </a:schemeClr>
+                </a:solidFill>
+              </a:defRPr>
+            </a:lvl4pPr>
+            <a:lvl5pPr marL="1828800" indent="0">
+              <a:buNone/>
+              <a:defRPr sz="1000">
+                <a:solidFill>
+                  <a:schemeClr val="tx1">
+                    <a:lumMod val="50000"/>
+                  </a:schemeClr>
+                </a:solidFill>
+              </a:defRPr>
+            </a:lvl5pPr>
+          </a:lstStyle>
+          <a:p>
+            <a:pPr lvl="0"/>
+            <a:r>
+              <a:rPr lang="en-US" dirty="0"/>
+              <a:t>Click to edit Master text styles</a:t>
+            </a:r>
+            <a:endParaRPr lang="en-BE" dirty="0"/>
+          </a:p>
+        </p:txBody>
+      </p:sp>
     </p:spTree>
     <p:extLst>
       <p:ext uri="{BB962C8B-B14F-4D97-AF65-F5344CB8AC3E}">
@@ -1054,6 +1406,94 @@
               <a:t>Klik om stijl te bewerken</a:t>
             </a:r>
             <a:endParaRPr lang="en-US" dirty="0"/>
+          </a:p>
+        </p:txBody>
+      </p:sp>
+      <p:sp>
+        <p:nvSpPr>
+          <p:cNvPr id="4" name="Content Placeholder 5">
+            <a:extLst>
+              <a:ext uri="{FF2B5EF4-FFF2-40B4-BE49-F238E27FC236}">
+                <a16:creationId xmlns:a16="http://schemas.microsoft.com/office/drawing/2014/main" id="{800F2DB8-5CDE-435D-9A60-FF5BA4B37C94}"/>
+              </a:ext>
+            </a:extLst>
+          </p:cNvPr>
+          <p:cNvSpPr>
+            <a:spLocks noGrp="1"/>
+          </p:cNvSpPr>
+          <p:nvPr>
+            <p:ph sz="quarter" idx="10"/>
+          </p:nvPr>
+        </p:nvSpPr>
+        <p:spPr>
+          <a:xfrm>
+            <a:off x="0" y="6591993"/>
+            <a:ext cx="12192000" cy="266008"/>
+          </a:xfrm>
+        </p:spPr>
+        <p:txBody>
+          <a:bodyPr>
+            <a:noAutofit/>
+          </a:bodyPr>
+          <a:lstStyle>
+            <a:lvl1pPr marL="0" indent="0">
+              <a:buNone/>
+              <a:defRPr sz="1100">
+                <a:solidFill>
+                  <a:schemeClr val="tx1">
+                    <a:lumMod val="50000"/>
+                  </a:schemeClr>
+                </a:solidFill>
+              </a:defRPr>
+            </a:lvl1pPr>
+            <a:lvl2pPr marL="457200" indent="0">
+              <a:buNone/>
+              <a:defRPr sz="1000">
+                <a:solidFill>
+                  <a:schemeClr val="tx1">
+                    <a:lumMod val="50000"/>
+                  </a:schemeClr>
+                </a:solidFill>
+              </a:defRPr>
+            </a:lvl2pPr>
+            <a:lvl3pPr marL="914400" indent="0">
+              <a:buNone/>
+              <a:defRPr sz="1000">
+                <a:solidFill>
+                  <a:schemeClr val="tx1">
+                    <a:lumMod val="50000"/>
+                  </a:schemeClr>
+                </a:solidFill>
+              </a:defRPr>
+            </a:lvl3pPr>
+            <a:lvl4pPr marL="1371600" indent="0">
+              <a:buNone/>
+              <a:defRPr sz="1000">
+                <a:solidFill>
+                  <a:schemeClr val="tx1">
+                    <a:lumMod val="50000"/>
+                  </a:schemeClr>
+                </a:solidFill>
+              </a:defRPr>
+            </a:lvl4pPr>
+            <a:lvl5pPr marL="1828800" indent="0">
+              <a:buNone/>
+              <a:defRPr sz="1000">
+                <a:solidFill>
+                  <a:schemeClr val="tx1">
+                    <a:lumMod val="50000"/>
+                  </a:schemeClr>
+                </a:solidFill>
+              </a:defRPr>
+            </a:lvl5pPr>
+          </a:lstStyle>
+          <a:p>
+            <a:pPr lvl="0"/>
+            <a:r>
+              <a:rPr lang="en-US" dirty="0"/>
+              <a:t>Click to edit Master text styles</a:t>
+            </a:r>
+            <a:endParaRPr lang="en-BE" dirty="0"/>
           </a:p>
         </p:txBody>
       </p:sp>
@@ -1291,6 +1731,94 @@
           </a:p>
         </p:txBody>
       </p:sp>
+      <p:sp>
+        <p:nvSpPr>
+          <p:cNvPr id="6" name="Content Placeholder 5">
+            <a:extLst>
+              <a:ext uri="{FF2B5EF4-FFF2-40B4-BE49-F238E27FC236}">
+                <a16:creationId xmlns:a16="http://schemas.microsoft.com/office/drawing/2014/main" id="{D26F1EF3-1F1A-40BB-9893-E7BFBCE53AAA}"/>
+              </a:ext>
+            </a:extLst>
+          </p:cNvPr>
+          <p:cNvSpPr>
+            <a:spLocks noGrp="1"/>
+          </p:cNvSpPr>
+          <p:nvPr>
+            <p:ph sz="quarter" idx="12"/>
+          </p:nvPr>
+        </p:nvSpPr>
+        <p:spPr>
+          <a:xfrm>
+            <a:off x="0" y="6591993"/>
+            <a:ext cx="12192000" cy="266008"/>
+          </a:xfrm>
+        </p:spPr>
+        <p:txBody>
+          <a:bodyPr>
+            <a:noAutofit/>
+          </a:bodyPr>
+          <a:lstStyle>
+            <a:lvl1pPr marL="0" indent="0">
+              <a:buNone/>
+              <a:defRPr sz="1100">
+                <a:solidFill>
+                  <a:schemeClr val="tx1">
+                    <a:lumMod val="50000"/>
+                  </a:schemeClr>
+                </a:solidFill>
+              </a:defRPr>
+            </a:lvl1pPr>
+            <a:lvl2pPr marL="457200" indent="0">
+              <a:buNone/>
+              <a:defRPr sz="1000">
+                <a:solidFill>
+                  <a:schemeClr val="tx1">
+                    <a:lumMod val="50000"/>
+                  </a:schemeClr>
+                </a:solidFill>
+              </a:defRPr>
+            </a:lvl2pPr>
+            <a:lvl3pPr marL="914400" indent="0">
+              <a:buNone/>
+              <a:defRPr sz="1000">
+                <a:solidFill>
+                  <a:schemeClr val="tx1">
+                    <a:lumMod val="50000"/>
+                  </a:schemeClr>
+                </a:solidFill>
+              </a:defRPr>
+            </a:lvl3pPr>
+            <a:lvl4pPr marL="1371600" indent="0">
+              <a:buNone/>
+              <a:defRPr sz="1000">
+                <a:solidFill>
+                  <a:schemeClr val="tx1">
+                    <a:lumMod val="50000"/>
+                  </a:schemeClr>
+                </a:solidFill>
+              </a:defRPr>
+            </a:lvl4pPr>
+            <a:lvl5pPr marL="1828800" indent="0">
+              <a:buNone/>
+              <a:defRPr sz="1000">
+                <a:solidFill>
+                  <a:schemeClr val="tx1">
+                    <a:lumMod val="50000"/>
+                  </a:schemeClr>
+                </a:solidFill>
+              </a:defRPr>
+            </a:lvl5pPr>
+          </a:lstStyle>
+          <a:p>
+            <a:pPr lvl="0"/>
+            <a:r>
+              <a:rPr lang="en-US" dirty="0"/>
+              <a:t>Click to edit Master text styles</a:t>
+            </a:r>
+            <a:endParaRPr lang="en-BE" dirty="0"/>
+          </a:p>
+        </p:txBody>
+      </p:sp>
     </p:spTree>
     <p:extLst>
       <p:ext uri="{BB962C8B-B14F-4D97-AF65-F5344CB8AC3E}">
@@ -1630,6 +2158,94 @@
               <a:t>Klik op het pictogram als u een afbeelding wilt toevoegen</a:t>
             </a:r>
             <a:endParaRPr lang="en-US" dirty="0"/>
+          </a:p>
+        </p:txBody>
+      </p:sp>
+      <p:sp>
+        <p:nvSpPr>
+          <p:cNvPr id="7" name="Content Placeholder 5">
+            <a:extLst>
+              <a:ext uri="{FF2B5EF4-FFF2-40B4-BE49-F238E27FC236}">
+                <a16:creationId xmlns:a16="http://schemas.microsoft.com/office/drawing/2014/main" id="{CC617A19-1670-4968-9BEE-27E517310D1E}"/>
+              </a:ext>
+            </a:extLst>
+          </p:cNvPr>
+          <p:cNvSpPr>
+            <a:spLocks noGrp="1"/>
+          </p:cNvSpPr>
+          <p:nvPr>
+            <p:ph sz="quarter" idx="10"/>
+          </p:nvPr>
+        </p:nvSpPr>
+        <p:spPr>
+          <a:xfrm>
+            <a:off x="0" y="6591993"/>
+            <a:ext cx="12192000" cy="266008"/>
+          </a:xfrm>
+        </p:spPr>
+        <p:txBody>
+          <a:bodyPr>
+            <a:noAutofit/>
+          </a:bodyPr>
+          <a:lstStyle>
+            <a:lvl1pPr marL="0" indent="0">
+              <a:buNone/>
+              <a:defRPr sz="1100">
+                <a:solidFill>
+                  <a:schemeClr val="tx1">
+                    <a:lumMod val="50000"/>
+                  </a:schemeClr>
+                </a:solidFill>
+              </a:defRPr>
+            </a:lvl1pPr>
+            <a:lvl2pPr marL="457200" indent="0">
+              <a:buNone/>
+              <a:defRPr sz="1000">
+                <a:solidFill>
+                  <a:schemeClr val="tx1">
+                    <a:lumMod val="50000"/>
+                  </a:schemeClr>
+                </a:solidFill>
+              </a:defRPr>
+            </a:lvl2pPr>
+            <a:lvl3pPr marL="914400" indent="0">
+              <a:buNone/>
+              <a:defRPr sz="1000">
+                <a:solidFill>
+                  <a:schemeClr val="tx1">
+                    <a:lumMod val="50000"/>
+                  </a:schemeClr>
+                </a:solidFill>
+              </a:defRPr>
+            </a:lvl3pPr>
+            <a:lvl4pPr marL="1371600" indent="0">
+              <a:buNone/>
+              <a:defRPr sz="1000">
+                <a:solidFill>
+                  <a:schemeClr val="tx1">
+                    <a:lumMod val="50000"/>
+                  </a:schemeClr>
+                </a:solidFill>
+              </a:defRPr>
+            </a:lvl4pPr>
+            <a:lvl5pPr marL="1828800" indent="0">
+              <a:buNone/>
+              <a:defRPr sz="1000">
+                <a:solidFill>
+                  <a:schemeClr val="tx1">
+                    <a:lumMod val="50000"/>
+                  </a:schemeClr>
+                </a:solidFill>
+              </a:defRPr>
+            </a:lvl5pPr>
+          </a:lstStyle>
+          <a:p>
+            <a:pPr lvl="0"/>
+            <a:r>
+              <a:rPr lang="en-US" dirty="0"/>
+              <a:t>Click to edit Master text styles</a:t>
+            </a:r>
+            <a:endParaRPr lang="en-BE" dirty="0"/>
           </a:p>
         </p:txBody>
       </p:sp>
@@ -2374,6 +2990,94 @@
               <a:t>Klik op het pictogram als u een afbeelding wilt toevoegen</a:t>
             </a:r>
             <a:endParaRPr lang="en-US" dirty="0"/>
+          </a:p>
+        </p:txBody>
+      </p:sp>
+      <p:sp>
+        <p:nvSpPr>
+          <p:cNvPr id="9" name="Content Placeholder 5">
+            <a:extLst>
+              <a:ext uri="{FF2B5EF4-FFF2-40B4-BE49-F238E27FC236}">
+                <a16:creationId xmlns:a16="http://schemas.microsoft.com/office/drawing/2014/main" id="{3D102C3A-7048-4E22-9DF4-3EEFB2E7EC6A}"/>
+              </a:ext>
+            </a:extLst>
+          </p:cNvPr>
+          <p:cNvSpPr>
+            <a:spLocks noGrp="1"/>
+          </p:cNvSpPr>
+          <p:nvPr>
+            <p:ph sz="quarter" idx="10"/>
+          </p:nvPr>
+        </p:nvSpPr>
+        <p:spPr>
+          <a:xfrm>
+            <a:off x="0" y="6591993"/>
+            <a:ext cx="12192000" cy="266008"/>
+          </a:xfrm>
+        </p:spPr>
+        <p:txBody>
+          <a:bodyPr>
+            <a:noAutofit/>
+          </a:bodyPr>
+          <a:lstStyle>
+            <a:lvl1pPr marL="0" indent="0">
+              <a:buNone/>
+              <a:defRPr sz="1100">
+                <a:solidFill>
+                  <a:schemeClr val="tx1">
+                    <a:lumMod val="50000"/>
+                  </a:schemeClr>
+                </a:solidFill>
+              </a:defRPr>
+            </a:lvl1pPr>
+            <a:lvl2pPr marL="457200" indent="0">
+              <a:buNone/>
+              <a:defRPr sz="1000">
+                <a:solidFill>
+                  <a:schemeClr val="tx1">
+                    <a:lumMod val="50000"/>
+                  </a:schemeClr>
+                </a:solidFill>
+              </a:defRPr>
+            </a:lvl2pPr>
+            <a:lvl3pPr marL="914400" indent="0">
+              <a:buNone/>
+              <a:defRPr sz="1000">
+                <a:solidFill>
+                  <a:schemeClr val="tx1">
+                    <a:lumMod val="50000"/>
+                  </a:schemeClr>
+                </a:solidFill>
+              </a:defRPr>
+            </a:lvl3pPr>
+            <a:lvl4pPr marL="1371600" indent="0">
+              <a:buNone/>
+              <a:defRPr sz="1000">
+                <a:solidFill>
+                  <a:schemeClr val="tx1">
+                    <a:lumMod val="50000"/>
+                  </a:schemeClr>
+                </a:solidFill>
+              </a:defRPr>
+            </a:lvl4pPr>
+            <a:lvl5pPr marL="1828800" indent="0">
+              <a:buNone/>
+              <a:defRPr sz="1000">
+                <a:solidFill>
+                  <a:schemeClr val="tx1">
+                    <a:lumMod val="50000"/>
+                  </a:schemeClr>
+                </a:solidFill>
+              </a:defRPr>
+            </a:lvl5pPr>
+          </a:lstStyle>
+          <a:p>
+            <a:pPr lvl="0"/>
+            <a:r>
+              <a:rPr lang="en-US" dirty="0"/>
+              <a:t>Click to edit Master text styles</a:t>
+            </a:r>
+            <a:endParaRPr lang="en-BE" dirty="0"/>
           </a:p>
         </p:txBody>
       </p:sp>
@@ -3071,6 +3775,94 @@
           </a:p>
         </p:txBody>
       </p:sp>
+      <p:sp>
+        <p:nvSpPr>
+          <p:cNvPr id="5" name="Content Placeholder 5">
+            <a:extLst>
+              <a:ext uri="{FF2B5EF4-FFF2-40B4-BE49-F238E27FC236}">
+                <a16:creationId xmlns:a16="http://schemas.microsoft.com/office/drawing/2014/main" id="{E4CEAD44-92D7-4FDB-BCBA-6D0339FB411C}"/>
+              </a:ext>
+            </a:extLst>
+          </p:cNvPr>
+          <p:cNvSpPr>
+            <a:spLocks noGrp="1"/>
+          </p:cNvSpPr>
+          <p:nvPr>
+            <p:ph sz="quarter" idx="11"/>
+          </p:nvPr>
+        </p:nvSpPr>
+        <p:spPr>
+          <a:xfrm>
+            <a:off x="0" y="6591993"/>
+            <a:ext cx="12192000" cy="266008"/>
+          </a:xfrm>
+        </p:spPr>
+        <p:txBody>
+          <a:bodyPr>
+            <a:noAutofit/>
+          </a:bodyPr>
+          <a:lstStyle>
+            <a:lvl1pPr marL="0" indent="0">
+              <a:buNone/>
+              <a:defRPr sz="1100">
+                <a:solidFill>
+                  <a:schemeClr val="tx1">
+                    <a:lumMod val="50000"/>
+                  </a:schemeClr>
+                </a:solidFill>
+              </a:defRPr>
+            </a:lvl1pPr>
+            <a:lvl2pPr marL="457200" indent="0">
+              <a:buNone/>
+              <a:defRPr sz="1000">
+                <a:solidFill>
+                  <a:schemeClr val="tx1">
+                    <a:lumMod val="50000"/>
+                  </a:schemeClr>
+                </a:solidFill>
+              </a:defRPr>
+            </a:lvl2pPr>
+            <a:lvl3pPr marL="914400" indent="0">
+              <a:buNone/>
+              <a:defRPr sz="1000">
+                <a:solidFill>
+                  <a:schemeClr val="tx1">
+                    <a:lumMod val="50000"/>
+                  </a:schemeClr>
+                </a:solidFill>
+              </a:defRPr>
+            </a:lvl3pPr>
+            <a:lvl4pPr marL="1371600" indent="0">
+              <a:buNone/>
+              <a:defRPr sz="1000">
+                <a:solidFill>
+                  <a:schemeClr val="tx1">
+                    <a:lumMod val="50000"/>
+                  </a:schemeClr>
+                </a:solidFill>
+              </a:defRPr>
+            </a:lvl4pPr>
+            <a:lvl5pPr marL="1828800" indent="0">
+              <a:buNone/>
+              <a:defRPr sz="1000">
+                <a:solidFill>
+                  <a:schemeClr val="tx1">
+                    <a:lumMod val="50000"/>
+                  </a:schemeClr>
+                </a:solidFill>
+              </a:defRPr>
+            </a:lvl5pPr>
+          </a:lstStyle>
+          <a:p>
+            <a:pPr lvl="0"/>
+            <a:r>
+              <a:rPr lang="en-US" dirty="0"/>
+              <a:t>Click to edit Master text styles</a:t>
+            </a:r>
+            <a:endParaRPr lang="en-BE" dirty="0"/>
+          </a:p>
+        </p:txBody>
+      </p:sp>
     </p:spTree>
     <p:extLst>
       <p:ext uri="{BB962C8B-B14F-4D97-AF65-F5344CB8AC3E}">
@@ -3085,7 +3877,7 @@
 </file>
 
 <file path=ppt/slideLayouts/slideLayout2.xml><?xml version="1.0" encoding="utf-8"?>
-<p:sldLayout xmlns:a="http://schemas.openxmlformats.org/drawingml/2006/main" xmlns:r="http://schemas.openxmlformats.org/officeDocument/2006/relationships" xmlns:p="http://schemas.openxmlformats.org/presentationml/2006/main" type="obj" preserve="1">
+<p:sldLayout xmlns:a="http://schemas.openxmlformats.org/drawingml/2006/main" xmlns:r="http://schemas.openxmlformats.org/officeDocument/2006/relationships" xmlns:p="http://schemas.openxmlformats.org/presentationml/2006/main" preserve="1" userDrawn="1">
   <p:cSld name="Titel en object">
     <p:spTree>
       <p:nvGrpSpPr>
@@ -3176,6 +3968,94 @@
           </a:p>
         </p:txBody>
       </p:sp>
+      <p:sp>
+        <p:nvSpPr>
+          <p:cNvPr id="5" name="Content Placeholder 5">
+            <a:extLst>
+              <a:ext uri="{FF2B5EF4-FFF2-40B4-BE49-F238E27FC236}">
+                <a16:creationId xmlns:a16="http://schemas.microsoft.com/office/drawing/2014/main" id="{46A8F5B1-FD8C-48F8-8C21-F516F67841B5}"/>
+              </a:ext>
+            </a:extLst>
+          </p:cNvPr>
+          <p:cNvSpPr>
+            <a:spLocks noGrp="1"/>
+          </p:cNvSpPr>
+          <p:nvPr>
+            <p:ph sz="quarter" idx="10"/>
+          </p:nvPr>
+        </p:nvSpPr>
+        <p:spPr>
+          <a:xfrm>
+            <a:off x="0" y="6591993"/>
+            <a:ext cx="12192000" cy="266008"/>
+          </a:xfrm>
+        </p:spPr>
+        <p:txBody>
+          <a:bodyPr>
+            <a:noAutofit/>
+          </a:bodyPr>
+          <a:lstStyle>
+            <a:lvl1pPr marL="0" indent="0">
+              <a:buNone/>
+              <a:defRPr sz="1100">
+                <a:solidFill>
+                  <a:schemeClr val="tx1">
+                    <a:lumMod val="50000"/>
+                  </a:schemeClr>
+                </a:solidFill>
+              </a:defRPr>
+            </a:lvl1pPr>
+            <a:lvl2pPr marL="457200" indent="0">
+              <a:buNone/>
+              <a:defRPr sz="1000">
+                <a:solidFill>
+                  <a:schemeClr val="tx1">
+                    <a:lumMod val="50000"/>
+                  </a:schemeClr>
+                </a:solidFill>
+              </a:defRPr>
+            </a:lvl2pPr>
+            <a:lvl3pPr marL="914400" indent="0">
+              <a:buNone/>
+              <a:defRPr sz="1000">
+                <a:solidFill>
+                  <a:schemeClr val="tx1">
+                    <a:lumMod val="50000"/>
+                  </a:schemeClr>
+                </a:solidFill>
+              </a:defRPr>
+            </a:lvl3pPr>
+            <a:lvl4pPr marL="1371600" indent="0">
+              <a:buNone/>
+              <a:defRPr sz="1000">
+                <a:solidFill>
+                  <a:schemeClr val="tx1">
+                    <a:lumMod val="50000"/>
+                  </a:schemeClr>
+                </a:solidFill>
+              </a:defRPr>
+            </a:lvl4pPr>
+            <a:lvl5pPr marL="1828800" indent="0">
+              <a:buNone/>
+              <a:defRPr sz="1000">
+                <a:solidFill>
+                  <a:schemeClr val="tx1">
+                    <a:lumMod val="50000"/>
+                  </a:schemeClr>
+                </a:solidFill>
+              </a:defRPr>
+            </a:lvl5pPr>
+          </a:lstStyle>
+          <a:p>
+            <a:pPr lvl="0"/>
+            <a:r>
+              <a:rPr lang="en-US" dirty="0"/>
+              <a:t>Click to edit Master text styles</a:t>
+            </a:r>
+            <a:endParaRPr lang="en-BE" dirty="0"/>
+          </a:p>
+        </p:txBody>
+      </p:sp>
     </p:spTree>
     <p:extLst>
       <p:ext uri="{BB962C8B-B14F-4D97-AF65-F5344CB8AC3E}">
@@ -3190,7 +4070,7 @@
 </file>
 
 <file path=ppt/slideLayouts/slideLayout3.xml><?xml version="1.0" encoding="utf-8"?>
-<p:sldLayout xmlns:a="http://schemas.openxmlformats.org/drawingml/2006/main" xmlns:r="http://schemas.openxmlformats.org/officeDocument/2006/relationships" xmlns:p="http://schemas.openxmlformats.org/presentationml/2006/main" type="secHead" preserve="1">
+<p:sldLayout xmlns:a="http://schemas.openxmlformats.org/drawingml/2006/main" xmlns:r="http://schemas.openxmlformats.org/officeDocument/2006/relationships" xmlns:p="http://schemas.openxmlformats.org/presentationml/2006/main" preserve="1" userDrawn="1">
   <p:cSld name="Sectiekop">
     <p:spTree>
       <p:nvGrpSpPr>
@@ -3357,6 +4237,94 @@
           </a:p>
         </p:txBody>
       </p:sp>
+      <p:sp>
+        <p:nvSpPr>
+          <p:cNvPr id="4" name="Content Placeholder 5">
+            <a:extLst>
+              <a:ext uri="{FF2B5EF4-FFF2-40B4-BE49-F238E27FC236}">
+                <a16:creationId xmlns:a16="http://schemas.microsoft.com/office/drawing/2014/main" id="{E6E28DB3-BF47-4E10-A38A-2439A9071D91}"/>
+              </a:ext>
+            </a:extLst>
+          </p:cNvPr>
+          <p:cNvSpPr>
+            <a:spLocks noGrp="1"/>
+          </p:cNvSpPr>
+          <p:nvPr>
+            <p:ph sz="quarter" idx="10"/>
+          </p:nvPr>
+        </p:nvSpPr>
+        <p:spPr>
+          <a:xfrm>
+            <a:off x="0" y="6591993"/>
+            <a:ext cx="12192000" cy="266008"/>
+          </a:xfrm>
+        </p:spPr>
+        <p:txBody>
+          <a:bodyPr>
+            <a:noAutofit/>
+          </a:bodyPr>
+          <a:lstStyle>
+            <a:lvl1pPr marL="0" indent="0">
+              <a:buNone/>
+              <a:defRPr sz="1100">
+                <a:solidFill>
+                  <a:schemeClr val="tx1">
+                    <a:lumMod val="50000"/>
+                  </a:schemeClr>
+                </a:solidFill>
+              </a:defRPr>
+            </a:lvl1pPr>
+            <a:lvl2pPr marL="457200" indent="0">
+              <a:buNone/>
+              <a:defRPr sz="1000">
+                <a:solidFill>
+                  <a:schemeClr val="tx1">
+                    <a:lumMod val="50000"/>
+                  </a:schemeClr>
+                </a:solidFill>
+              </a:defRPr>
+            </a:lvl2pPr>
+            <a:lvl3pPr marL="914400" indent="0">
+              <a:buNone/>
+              <a:defRPr sz="1000">
+                <a:solidFill>
+                  <a:schemeClr val="tx1">
+                    <a:lumMod val="50000"/>
+                  </a:schemeClr>
+                </a:solidFill>
+              </a:defRPr>
+            </a:lvl3pPr>
+            <a:lvl4pPr marL="1371600" indent="0">
+              <a:buNone/>
+              <a:defRPr sz="1000">
+                <a:solidFill>
+                  <a:schemeClr val="tx1">
+                    <a:lumMod val="50000"/>
+                  </a:schemeClr>
+                </a:solidFill>
+              </a:defRPr>
+            </a:lvl4pPr>
+            <a:lvl5pPr marL="1828800" indent="0">
+              <a:buNone/>
+              <a:defRPr sz="1000">
+                <a:solidFill>
+                  <a:schemeClr val="tx1">
+                    <a:lumMod val="50000"/>
+                  </a:schemeClr>
+                </a:solidFill>
+              </a:defRPr>
+            </a:lvl5pPr>
+          </a:lstStyle>
+          <a:p>
+            <a:pPr lvl="0"/>
+            <a:r>
+              <a:rPr lang="en-US" dirty="0"/>
+              <a:t>Click to edit Master text styles</a:t>
+            </a:r>
+            <a:endParaRPr lang="en-BE" dirty="0"/>
+          </a:p>
+        </p:txBody>
+      </p:sp>
     </p:spTree>
     <p:extLst>
       <p:ext uri="{BB962C8B-B14F-4D97-AF65-F5344CB8AC3E}">
@@ -3371,7 +4339,7 @@
 </file>
 
 <file path=ppt/slideLayouts/slideLayout4.xml><?xml version="1.0" encoding="utf-8"?>
-<p:sldLayout xmlns:a="http://schemas.openxmlformats.org/drawingml/2006/main" xmlns:r="http://schemas.openxmlformats.org/officeDocument/2006/relationships" xmlns:p="http://schemas.openxmlformats.org/presentationml/2006/main" type="twoObj" preserve="1">
+<p:sldLayout xmlns:a="http://schemas.openxmlformats.org/drawingml/2006/main" xmlns:r="http://schemas.openxmlformats.org/officeDocument/2006/relationships" xmlns:p="http://schemas.openxmlformats.org/presentationml/2006/main" preserve="1" userDrawn="1">
   <p:cSld name="Inhoud van twee">
     <p:spTree>
       <p:nvGrpSpPr>
@@ -3524,6 +4492,94 @@
           </a:p>
         </p:txBody>
       </p:sp>
+      <p:sp>
+        <p:nvSpPr>
+          <p:cNvPr id="5" name="Content Placeholder 5">
+            <a:extLst>
+              <a:ext uri="{FF2B5EF4-FFF2-40B4-BE49-F238E27FC236}">
+                <a16:creationId xmlns:a16="http://schemas.microsoft.com/office/drawing/2014/main" id="{499C8D38-9515-4B90-9D9A-A93B3D9259F2}"/>
+              </a:ext>
+            </a:extLst>
+          </p:cNvPr>
+          <p:cNvSpPr>
+            <a:spLocks noGrp="1"/>
+          </p:cNvSpPr>
+          <p:nvPr>
+            <p:ph sz="quarter" idx="10"/>
+          </p:nvPr>
+        </p:nvSpPr>
+        <p:spPr>
+          <a:xfrm>
+            <a:off x="0" y="6591993"/>
+            <a:ext cx="12192000" cy="266008"/>
+          </a:xfrm>
+        </p:spPr>
+        <p:txBody>
+          <a:bodyPr>
+            <a:noAutofit/>
+          </a:bodyPr>
+          <a:lstStyle>
+            <a:lvl1pPr marL="0" indent="0">
+              <a:buNone/>
+              <a:defRPr sz="1100">
+                <a:solidFill>
+                  <a:schemeClr val="tx1">
+                    <a:lumMod val="50000"/>
+                  </a:schemeClr>
+                </a:solidFill>
+              </a:defRPr>
+            </a:lvl1pPr>
+            <a:lvl2pPr marL="457200" indent="0">
+              <a:buNone/>
+              <a:defRPr sz="1000">
+                <a:solidFill>
+                  <a:schemeClr val="tx1">
+                    <a:lumMod val="50000"/>
+                  </a:schemeClr>
+                </a:solidFill>
+              </a:defRPr>
+            </a:lvl2pPr>
+            <a:lvl3pPr marL="914400" indent="0">
+              <a:buNone/>
+              <a:defRPr sz="1000">
+                <a:solidFill>
+                  <a:schemeClr val="tx1">
+                    <a:lumMod val="50000"/>
+                  </a:schemeClr>
+                </a:solidFill>
+              </a:defRPr>
+            </a:lvl3pPr>
+            <a:lvl4pPr marL="1371600" indent="0">
+              <a:buNone/>
+              <a:defRPr sz="1000">
+                <a:solidFill>
+                  <a:schemeClr val="tx1">
+                    <a:lumMod val="50000"/>
+                  </a:schemeClr>
+                </a:solidFill>
+              </a:defRPr>
+            </a:lvl4pPr>
+            <a:lvl5pPr marL="1828800" indent="0">
+              <a:buNone/>
+              <a:defRPr sz="1000">
+                <a:solidFill>
+                  <a:schemeClr val="tx1">
+                    <a:lumMod val="50000"/>
+                  </a:schemeClr>
+                </a:solidFill>
+              </a:defRPr>
+            </a:lvl5pPr>
+          </a:lstStyle>
+          <a:p>
+            <a:pPr lvl="0"/>
+            <a:r>
+              <a:rPr lang="en-US" dirty="0"/>
+              <a:t>Click to edit Master text styles</a:t>
+            </a:r>
+            <a:endParaRPr lang="en-BE" dirty="0"/>
+          </a:p>
+        </p:txBody>
+      </p:sp>
     </p:spTree>
     <p:extLst>
       <p:ext uri="{BB962C8B-B14F-4D97-AF65-F5344CB8AC3E}">
@@ -3538,7 +4594,7 @@
 </file>
 
 <file path=ppt/slideLayouts/slideLayout5.xml><?xml version="1.0" encoding="utf-8"?>
-<p:sldLayout xmlns:a="http://schemas.openxmlformats.org/drawingml/2006/main" xmlns:r="http://schemas.openxmlformats.org/officeDocument/2006/relationships" xmlns:p="http://schemas.openxmlformats.org/presentationml/2006/main" type="twoTxTwoObj" preserve="1">
+<p:sldLayout xmlns:a="http://schemas.openxmlformats.org/drawingml/2006/main" xmlns:r="http://schemas.openxmlformats.org/officeDocument/2006/relationships" xmlns:p="http://schemas.openxmlformats.org/presentationml/2006/main" preserve="1" userDrawn="1">
   <p:cSld name="Vergelijking">
     <p:spTree>
       <p:nvGrpSpPr>
@@ -3823,6 +4879,94 @@
               <a:t>Vijfde niveau</a:t>
             </a:r>
             <a:endParaRPr lang="en-US" dirty="0"/>
+          </a:p>
+        </p:txBody>
+      </p:sp>
+      <p:sp>
+        <p:nvSpPr>
+          <p:cNvPr id="7" name="Content Placeholder 5">
+            <a:extLst>
+              <a:ext uri="{FF2B5EF4-FFF2-40B4-BE49-F238E27FC236}">
+                <a16:creationId xmlns:a16="http://schemas.microsoft.com/office/drawing/2014/main" id="{EF771509-DD4C-4527-8F57-AA21855145F2}"/>
+              </a:ext>
+            </a:extLst>
+          </p:cNvPr>
+          <p:cNvSpPr>
+            <a:spLocks noGrp="1"/>
+          </p:cNvSpPr>
+          <p:nvPr>
+            <p:ph sz="quarter" idx="10"/>
+          </p:nvPr>
+        </p:nvSpPr>
+        <p:spPr>
+          <a:xfrm>
+            <a:off x="0" y="6591993"/>
+            <a:ext cx="12192000" cy="266008"/>
+          </a:xfrm>
+        </p:spPr>
+        <p:txBody>
+          <a:bodyPr>
+            <a:noAutofit/>
+          </a:bodyPr>
+          <a:lstStyle>
+            <a:lvl1pPr marL="0" indent="0">
+              <a:buNone/>
+              <a:defRPr sz="1100">
+                <a:solidFill>
+                  <a:schemeClr val="tx1">
+                    <a:lumMod val="50000"/>
+                  </a:schemeClr>
+                </a:solidFill>
+              </a:defRPr>
+            </a:lvl1pPr>
+            <a:lvl2pPr marL="457200" indent="0">
+              <a:buNone/>
+              <a:defRPr sz="1000">
+                <a:solidFill>
+                  <a:schemeClr val="tx1">
+                    <a:lumMod val="50000"/>
+                  </a:schemeClr>
+                </a:solidFill>
+              </a:defRPr>
+            </a:lvl2pPr>
+            <a:lvl3pPr marL="914400" indent="0">
+              <a:buNone/>
+              <a:defRPr sz="1000">
+                <a:solidFill>
+                  <a:schemeClr val="tx1">
+                    <a:lumMod val="50000"/>
+                  </a:schemeClr>
+                </a:solidFill>
+              </a:defRPr>
+            </a:lvl3pPr>
+            <a:lvl4pPr marL="1371600" indent="0">
+              <a:buNone/>
+              <a:defRPr sz="1000">
+                <a:solidFill>
+                  <a:schemeClr val="tx1">
+                    <a:lumMod val="50000"/>
+                  </a:schemeClr>
+                </a:solidFill>
+              </a:defRPr>
+            </a:lvl4pPr>
+            <a:lvl5pPr marL="1828800" indent="0">
+              <a:buNone/>
+              <a:defRPr sz="1000">
+                <a:solidFill>
+                  <a:schemeClr val="tx1">
+                    <a:lumMod val="50000"/>
+                  </a:schemeClr>
+                </a:solidFill>
+              </a:defRPr>
+            </a:lvl5pPr>
+          </a:lstStyle>
+          <a:p>
+            <a:pPr lvl="0"/>
+            <a:r>
+              <a:rPr lang="en-US" dirty="0"/>
+              <a:t>Click to edit Master text styles</a:t>
+            </a:r>
+            <a:endParaRPr lang="en-BE" dirty="0"/>
           </a:p>
         </p:txBody>
       </p:sp>
@@ -4722,7 +5866,7 @@
 </file>
 
 <file path=ppt/slideLayouts/slideLayout6.xml><?xml version="1.0" encoding="utf-8"?>
-<p:sldLayout xmlns:a="http://schemas.openxmlformats.org/drawingml/2006/main" xmlns:r="http://schemas.openxmlformats.org/officeDocument/2006/relationships" xmlns:p="http://schemas.openxmlformats.org/presentationml/2006/main" type="titleOnly" preserve="1">
+<p:sldLayout xmlns:a="http://schemas.openxmlformats.org/drawingml/2006/main" xmlns:r="http://schemas.openxmlformats.org/officeDocument/2006/relationships" xmlns:p="http://schemas.openxmlformats.org/presentationml/2006/main" preserve="1" userDrawn="1">
   <p:cSld name="Alleen titel">
     <p:spTree>
       <p:nvGrpSpPr>
@@ -4761,6 +5905,94 @@
           </a:p>
         </p:txBody>
       </p:sp>
+      <p:sp>
+        <p:nvSpPr>
+          <p:cNvPr id="3" name="Content Placeholder 5">
+            <a:extLst>
+              <a:ext uri="{FF2B5EF4-FFF2-40B4-BE49-F238E27FC236}">
+                <a16:creationId xmlns:a16="http://schemas.microsoft.com/office/drawing/2014/main" id="{48F0EAD6-FAD4-4824-9414-DD2E3EFEF128}"/>
+              </a:ext>
+            </a:extLst>
+          </p:cNvPr>
+          <p:cNvSpPr>
+            <a:spLocks noGrp="1"/>
+          </p:cNvSpPr>
+          <p:nvPr>
+            <p:ph sz="quarter" idx="10"/>
+          </p:nvPr>
+        </p:nvSpPr>
+        <p:spPr>
+          <a:xfrm>
+            <a:off x="0" y="6591993"/>
+            <a:ext cx="12192000" cy="266008"/>
+          </a:xfrm>
+        </p:spPr>
+        <p:txBody>
+          <a:bodyPr>
+            <a:noAutofit/>
+          </a:bodyPr>
+          <a:lstStyle>
+            <a:lvl1pPr marL="0" indent="0">
+              <a:buNone/>
+              <a:defRPr sz="1100">
+                <a:solidFill>
+                  <a:schemeClr val="tx1">
+                    <a:lumMod val="50000"/>
+                  </a:schemeClr>
+                </a:solidFill>
+              </a:defRPr>
+            </a:lvl1pPr>
+            <a:lvl2pPr marL="457200" indent="0">
+              <a:buNone/>
+              <a:defRPr sz="1000">
+                <a:solidFill>
+                  <a:schemeClr val="tx1">
+                    <a:lumMod val="50000"/>
+                  </a:schemeClr>
+                </a:solidFill>
+              </a:defRPr>
+            </a:lvl2pPr>
+            <a:lvl3pPr marL="914400" indent="0">
+              <a:buNone/>
+              <a:defRPr sz="1000">
+                <a:solidFill>
+                  <a:schemeClr val="tx1">
+                    <a:lumMod val="50000"/>
+                  </a:schemeClr>
+                </a:solidFill>
+              </a:defRPr>
+            </a:lvl3pPr>
+            <a:lvl4pPr marL="1371600" indent="0">
+              <a:buNone/>
+              <a:defRPr sz="1000">
+                <a:solidFill>
+                  <a:schemeClr val="tx1">
+                    <a:lumMod val="50000"/>
+                  </a:schemeClr>
+                </a:solidFill>
+              </a:defRPr>
+            </a:lvl4pPr>
+            <a:lvl5pPr marL="1828800" indent="0">
+              <a:buNone/>
+              <a:defRPr sz="1000">
+                <a:solidFill>
+                  <a:schemeClr val="tx1">
+                    <a:lumMod val="50000"/>
+                  </a:schemeClr>
+                </a:solidFill>
+              </a:defRPr>
+            </a:lvl5pPr>
+          </a:lstStyle>
+          <a:p>
+            <a:pPr lvl="0"/>
+            <a:r>
+              <a:rPr lang="en-US" dirty="0"/>
+              <a:t>Click to edit Master text styles</a:t>
+            </a:r>
+            <a:endParaRPr lang="en-BE" dirty="0"/>
+          </a:p>
+        </p:txBody>
+      </p:sp>
     </p:spTree>
     <p:extLst>
       <p:ext uri="{BB962C8B-B14F-4D97-AF65-F5344CB8AC3E}">
@@ -4775,7 +6007,7 @@
 </file>
 
 <file path=ppt/slideLayouts/slideLayout7.xml><?xml version="1.0" encoding="utf-8"?>
-<p:sldLayout xmlns:a="http://schemas.openxmlformats.org/drawingml/2006/main" xmlns:r="http://schemas.openxmlformats.org/officeDocument/2006/relationships" xmlns:p="http://schemas.openxmlformats.org/presentationml/2006/main" type="blank" preserve="1">
+<p:sldLayout xmlns:a="http://schemas.openxmlformats.org/drawingml/2006/main" xmlns:r="http://schemas.openxmlformats.org/officeDocument/2006/relationships" xmlns:p="http://schemas.openxmlformats.org/presentationml/2006/main" preserve="1" userDrawn="1">
   <p:cSld name="Leeg">
     <p:spTree>
       <p:nvGrpSpPr>
@@ -4791,6 +6023,94 @@
           <a:chExt cx="0" cy="0"/>
         </a:xfrm>
       </p:grpSpPr>
+      <p:sp>
+        <p:nvSpPr>
+          <p:cNvPr id="2" name="Content Placeholder 5">
+            <a:extLst>
+              <a:ext uri="{FF2B5EF4-FFF2-40B4-BE49-F238E27FC236}">
+                <a16:creationId xmlns:a16="http://schemas.microsoft.com/office/drawing/2014/main" id="{AB20CD75-E374-40D1-AC39-23CD19682855}"/>
+              </a:ext>
+            </a:extLst>
+          </p:cNvPr>
+          <p:cNvSpPr>
+            <a:spLocks noGrp="1"/>
+          </p:cNvSpPr>
+          <p:nvPr>
+            <p:ph sz="quarter" idx="10"/>
+          </p:nvPr>
+        </p:nvSpPr>
+        <p:spPr>
+          <a:xfrm>
+            <a:off x="0" y="6591993"/>
+            <a:ext cx="12192000" cy="266008"/>
+          </a:xfrm>
+        </p:spPr>
+        <p:txBody>
+          <a:bodyPr>
+            <a:noAutofit/>
+          </a:bodyPr>
+          <a:lstStyle>
+            <a:lvl1pPr marL="0" indent="0">
+              <a:buNone/>
+              <a:defRPr sz="1100">
+                <a:solidFill>
+                  <a:schemeClr val="tx1">
+                    <a:lumMod val="50000"/>
+                  </a:schemeClr>
+                </a:solidFill>
+              </a:defRPr>
+            </a:lvl1pPr>
+            <a:lvl2pPr marL="457200" indent="0">
+              <a:buNone/>
+              <a:defRPr sz="1000">
+                <a:solidFill>
+                  <a:schemeClr val="tx1">
+                    <a:lumMod val="50000"/>
+                  </a:schemeClr>
+                </a:solidFill>
+              </a:defRPr>
+            </a:lvl2pPr>
+            <a:lvl3pPr marL="914400" indent="0">
+              <a:buNone/>
+              <a:defRPr sz="1000">
+                <a:solidFill>
+                  <a:schemeClr val="tx1">
+                    <a:lumMod val="50000"/>
+                  </a:schemeClr>
+                </a:solidFill>
+              </a:defRPr>
+            </a:lvl3pPr>
+            <a:lvl4pPr marL="1371600" indent="0">
+              <a:buNone/>
+              <a:defRPr sz="1000">
+                <a:solidFill>
+                  <a:schemeClr val="tx1">
+                    <a:lumMod val="50000"/>
+                  </a:schemeClr>
+                </a:solidFill>
+              </a:defRPr>
+            </a:lvl4pPr>
+            <a:lvl5pPr marL="1828800" indent="0">
+              <a:buNone/>
+              <a:defRPr sz="1000">
+                <a:solidFill>
+                  <a:schemeClr val="tx1">
+                    <a:lumMod val="50000"/>
+                  </a:schemeClr>
+                </a:solidFill>
+              </a:defRPr>
+            </a:lvl5pPr>
+          </a:lstStyle>
+          <a:p>
+            <a:pPr lvl="0"/>
+            <a:r>
+              <a:rPr lang="en-US" dirty="0"/>
+              <a:t>Click to edit Master text styles</a:t>
+            </a:r>
+            <a:endParaRPr lang="en-BE" dirty="0"/>
+          </a:p>
+        </p:txBody>
+      </p:sp>
     </p:spTree>
     <p:extLst>
       <p:ext uri="{BB962C8B-B14F-4D97-AF65-F5344CB8AC3E}">
@@ -4805,7 +6125,7 @@
 </file>
 
 <file path=ppt/slideLayouts/slideLayout8.xml><?xml version="1.0" encoding="utf-8"?>
-<p:sldLayout xmlns:a="http://schemas.openxmlformats.org/drawingml/2006/main" xmlns:r="http://schemas.openxmlformats.org/officeDocument/2006/relationships" xmlns:p="http://schemas.openxmlformats.org/presentationml/2006/main" type="objTx" preserve="1">
+<p:sldLayout xmlns:a="http://schemas.openxmlformats.org/drawingml/2006/main" xmlns:r="http://schemas.openxmlformats.org/officeDocument/2006/relationships" xmlns:p="http://schemas.openxmlformats.org/presentationml/2006/main" preserve="1" userDrawn="1">
   <p:cSld name="Inhoud met bijschrift">
     <p:spTree>
       <p:nvGrpSpPr>
@@ -5003,6 +6323,94 @@
           </a:p>
         </p:txBody>
       </p:sp>
+      <p:sp>
+        <p:nvSpPr>
+          <p:cNvPr id="5" name="Content Placeholder 5">
+            <a:extLst>
+              <a:ext uri="{FF2B5EF4-FFF2-40B4-BE49-F238E27FC236}">
+                <a16:creationId xmlns:a16="http://schemas.microsoft.com/office/drawing/2014/main" id="{8C0E501C-A7AD-452B-B95C-BA24EE78CE69}"/>
+              </a:ext>
+            </a:extLst>
+          </p:cNvPr>
+          <p:cNvSpPr>
+            <a:spLocks noGrp="1"/>
+          </p:cNvSpPr>
+          <p:nvPr>
+            <p:ph sz="quarter" idx="10"/>
+          </p:nvPr>
+        </p:nvSpPr>
+        <p:spPr>
+          <a:xfrm>
+            <a:off x="0" y="6591993"/>
+            <a:ext cx="12192000" cy="266008"/>
+          </a:xfrm>
+        </p:spPr>
+        <p:txBody>
+          <a:bodyPr>
+            <a:noAutofit/>
+          </a:bodyPr>
+          <a:lstStyle>
+            <a:lvl1pPr marL="0" indent="0">
+              <a:buNone/>
+              <a:defRPr sz="1100">
+                <a:solidFill>
+                  <a:schemeClr val="tx1">
+                    <a:lumMod val="50000"/>
+                  </a:schemeClr>
+                </a:solidFill>
+              </a:defRPr>
+            </a:lvl1pPr>
+            <a:lvl2pPr marL="457200" indent="0">
+              <a:buNone/>
+              <a:defRPr sz="1000">
+                <a:solidFill>
+                  <a:schemeClr val="tx1">
+                    <a:lumMod val="50000"/>
+                  </a:schemeClr>
+                </a:solidFill>
+              </a:defRPr>
+            </a:lvl2pPr>
+            <a:lvl3pPr marL="914400" indent="0">
+              <a:buNone/>
+              <a:defRPr sz="1000">
+                <a:solidFill>
+                  <a:schemeClr val="tx1">
+                    <a:lumMod val="50000"/>
+                  </a:schemeClr>
+                </a:solidFill>
+              </a:defRPr>
+            </a:lvl3pPr>
+            <a:lvl4pPr marL="1371600" indent="0">
+              <a:buNone/>
+              <a:defRPr sz="1000">
+                <a:solidFill>
+                  <a:schemeClr val="tx1">
+                    <a:lumMod val="50000"/>
+                  </a:schemeClr>
+                </a:solidFill>
+              </a:defRPr>
+            </a:lvl4pPr>
+            <a:lvl5pPr marL="1828800" indent="0">
+              <a:buNone/>
+              <a:defRPr sz="1000">
+                <a:solidFill>
+                  <a:schemeClr val="tx1">
+                    <a:lumMod val="50000"/>
+                  </a:schemeClr>
+                </a:solidFill>
+              </a:defRPr>
+            </a:lvl5pPr>
+          </a:lstStyle>
+          <a:p>
+            <a:pPr lvl="0"/>
+            <a:r>
+              <a:rPr lang="en-US" dirty="0"/>
+              <a:t>Click to edit Master text styles</a:t>
+            </a:r>
+            <a:endParaRPr lang="en-BE" dirty="0"/>
+          </a:p>
+        </p:txBody>
+      </p:sp>
     </p:spTree>
     <p:extLst>
       <p:ext uri="{BB962C8B-B14F-4D97-AF65-F5344CB8AC3E}">
@@ -5017,7 +6425,7 @@
 </file>
 
 <file path=ppt/slideLayouts/slideLayout9.xml><?xml version="1.0" encoding="utf-8"?>
-<p:sldLayout xmlns:a="http://schemas.openxmlformats.org/drawingml/2006/main" xmlns:r="http://schemas.openxmlformats.org/officeDocument/2006/relationships" xmlns:p="http://schemas.openxmlformats.org/presentationml/2006/main" type="picTx" preserve="1">
+<p:sldLayout xmlns:a="http://schemas.openxmlformats.org/drawingml/2006/main" xmlns:r="http://schemas.openxmlformats.org/officeDocument/2006/relationships" xmlns:p="http://schemas.openxmlformats.org/presentationml/2006/main" preserve="1" userDrawn="1">
   <p:cSld name="Afbeelding met bijschrift">
     <p:spTree>
       <p:nvGrpSpPr>
@@ -5223,6 +6631,94 @@
               <a:t>‹#›</a:t>
             </a:fld>
             <a:endParaRPr lang="en-GB"/>
+          </a:p>
+        </p:txBody>
+      </p:sp>
+      <p:sp>
+        <p:nvSpPr>
+          <p:cNvPr id="6" name="Content Placeholder 5">
+            <a:extLst>
+              <a:ext uri="{FF2B5EF4-FFF2-40B4-BE49-F238E27FC236}">
+                <a16:creationId xmlns:a16="http://schemas.microsoft.com/office/drawing/2014/main" id="{9880932B-13A4-40E4-8FFC-6FD0FEFC54BF}"/>
+              </a:ext>
+            </a:extLst>
+          </p:cNvPr>
+          <p:cNvSpPr>
+            <a:spLocks noGrp="1"/>
+          </p:cNvSpPr>
+          <p:nvPr>
+            <p:ph sz="quarter" idx="10"/>
+          </p:nvPr>
+        </p:nvSpPr>
+        <p:spPr>
+          <a:xfrm>
+            <a:off x="0" y="6591993"/>
+            <a:ext cx="12192000" cy="266008"/>
+          </a:xfrm>
+        </p:spPr>
+        <p:txBody>
+          <a:bodyPr>
+            <a:noAutofit/>
+          </a:bodyPr>
+          <a:lstStyle>
+            <a:lvl1pPr marL="0" indent="0">
+              <a:buNone/>
+              <a:defRPr sz="1100">
+                <a:solidFill>
+                  <a:schemeClr val="tx1">
+                    <a:lumMod val="50000"/>
+                  </a:schemeClr>
+                </a:solidFill>
+              </a:defRPr>
+            </a:lvl1pPr>
+            <a:lvl2pPr marL="457200" indent="0">
+              <a:buNone/>
+              <a:defRPr sz="1000">
+                <a:solidFill>
+                  <a:schemeClr val="tx1">
+                    <a:lumMod val="50000"/>
+                  </a:schemeClr>
+                </a:solidFill>
+              </a:defRPr>
+            </a:lvl2pPr>
+            <a:lvl3pPr marL="914400" indent="0">
+              <a:buNone/>
+              <a:defRPr sz="1000">
+                <a:solidFill>
+                  <a:schemeClr val="tx1">
+                    <a:lumMod val="50000"/>
+                  </a:schemeClr>
+                </a:solidFill>
+              </a:defRPr>
+            </a:lvl3pPr>
+            <a:lvl4pPr marL="1371600" indent="0">
+              <a:buNone/>
+              <a:defRPr sz="1000">
+                <a:solidFill>
+                  <a:schemeClr val="tx1">
+                    <a:lumMod val="50000"/>
+                  </a:schemeClr>
+                </a:solidFill>
+              </a:defRPr>
+            </a:lvl4pPr>
+            <a:lvl5pPr marL="1828800" indent="0">
+              <a:buNone/>
+              <a:defRPr sz="1000">
+                <a:solidFill>
+                  <a:schemeClr val="tx1">
+                    <a:lumMod val="50000"/>
+                  </a:schemeClr>
+                </a:solidFill>
+              </a:defRPr>
+            </a:lvl5pPr>
+          </a:lstStyle>
+          <a:p>
+            <a:pPr lvl="0"/>
+            <a:r>
+              <a:rPr lang="en-US" dirty="0"/>
+              <a:t>Click to edit Master text styles</a:t>
+            </a:r>
+            <a:endParaRPr lang="en-BE" dirty="0"/>
           </a:p>
         </p:txBody>
       </p:sp>
@@ -5400,249 +6896,6 @@
               <a:t>‹#›</a:t>
             </a:fld>
             <a:endParaRPr lang="en-GB" dirty="0"/>
-          </a:p>
-        </p:txBody>
-      </p:sp>
-      <p:sp>
-        <p:nvSpPr>
-          <p:cNvPr id="5" name="Text Placeholder 2">
-            <a:extLst>
-              <a:ext uri="{FF2B5EF4-FFF2-40B4-BE49-F238E27FC236}">
-                <a16:creationId xmlns:a16="http://schemas.microsoft.com/office/drawing/2014/main" id="{24B759E9-C42E-4583-8FA1-4555068DAA5D}"/>
-              </a:ext>
-            </a:extLst>
-          </p:cNvPr>
-          <p:cNvSpPr txBox="1">
-            <a:spLocks/>
-          </p:cNvSpPr>
-          <p:nvPr userDrawn="1"/>
-        </p:nvSpPr>
-        <p:spPr>
-          <a:xfrm>
-            <a:off x="42389" y="6604906"/>
-            <a:ext cx="11311411" cy="165365"/>
-          </a:xfrm>
-          <a:prstGeom prst="rect">
-            <a:avLst/>
-          </a:prstGeom>
-        </p:spPr>
-        <p:txBody>
-          <a:bodyPr vert="horz" lIns="91440" tIns="45720" rIns="91440" bIns="45720" rtlCol="0">
-            <a:noAutofit/>
-          </a:bodyPr>
-          <a:lstStyle>
-            <a:lvl1pPr marL="228600" indent="-228600" algn="l" defTabSz="914400" rtl="0" eaLnBrk="1" latinLnBrk="0" hangingPunct="1">
-              <a:lnSpc>
-                <a:spcPct val="90000"/>
-              </a:lnSpc>
-              <a:spcBef>
-                <a:spcPts val="1000"/>
-              </a:spcBef>
-              <a:buFont typeface="Arial" panose="020B0604020202020204" pitchFamily="34" charset="0"/>
-              <a:buChar char="•"/>
-              <a:defRPr sz="3200" kern="1200">
-                <a:solidFill>
-                  <a:schemeClr val="tx1"/>
-                </a:solidFill>
-                <a:effectLst>
-                  <a:outerShdw blurRad="38100" dist="38100" dir="2700000" algn="tl">
-                    <a:srgbClr val="000000">
-                      <a:alpha val="43137"/>
-                    </a:srgbClr>
-                  </a:outerShdw>
-                </a:effectLst>
-                <a:latin typeface="+mn-lt"/>
-                <a:ea typeface="+mn-ea"/>
-                <a:cs typeface="+mn-cs"/>
-              </a:defRPr>
-            </a:lvl1pPr>
-            <a:lvl2pPr marL="685800" indent="-228600" algn="l" defTabSz="914400" rtl="0" eaLnBrk="1" latinLnBrk="0" hangingPunct="1">
-              <a:lnSpc>
-                <a:spcPct val="90000"/>
-              </a:lnSpc>
-              <a:spcBef>
-                <a:spcPts val="500"/>
-              </a:spcBef>
-              <a:buFont typeface="Arial" panose="020B0604020202020204" pitchFamily="34" charset="0"/>
-              <a:buChar char="•"/>
-              <a:defRPr sz="2800" kern="1200">
-                <a:solidFill>
-                  <a:schemeClr val="tx1"/>
-                </a:solidFill>
-                <a:effectLst>
-                  <a:outerShdw blurRad="38100" dist="38100" dir="2700000" algn="tl">
-                    <a:srgbClr val="000000">
-                      <a:alpha val="43137"/>
-                    </a:srgbClr>
-                  </a:outerShdw>
-                </a:effectLst>
-                <a:latin typeface="+mn-lt"/>
-                <a:ea typeface="+mn-ea"/>
-                <a:cs typeface="+mn-cs"/>
-              </a:defRPr>
-            </a:lvl2pPr>
-            <a:lvl3pPr marL="1143000" indent="-228600" algn="l" defTabSz="914400" rtl="0" eaLnBrk="1" latinLnBrk="0" hangingPunct="1">
-              <a:lnSpc>
-                <a:spcPct val="90000"/>
-              </a:lnSpc>
-              <a:spcBef>
-                <a:spcPts val="500"/>
-              </a:spcBef>
-              <a:buFont typeface="Arial" panose="020B0604020202020204" pitchFamily="34" charset="0"/>
-              <a:buChar char="•"/>
-              <a:defRPr sz="2400" kern="1200">
-                <a:solidFill>
-                  <a:schemeClr val="tx1"/>
-                </a:solidFill>
-                <a:effectLst>
-                  <a:outerShdw blurRad="38100" dist="38100" dir="2700000" algn="tl">
-                    <a:srgbClr val="000000">
-                      <a:alpha val="43137"/>
-                    </a:srgbClr>
-                  </a:outerShdw>
-                </a:effectLst>
-                <a:latin typeface="+mn-lt"/>
-                <a:ea typeface="+mn-ea"/>
-                <a:cs typeface="+mn-cs"/>
-              </a:defRPr>
-            </a:lvl3pPr>
-            <a:lvl4pPr marL="1600200" indent="-228600" algn="l" defTabSz="914400" rtl="0" eaLnBrk="1" latinLnBrk="0" hangingPunct="1">
-              <a:lnSpc>
-                <a:spcPct val="90000"/>
-              </a:lnSpc>
-              <a:spcBef>
-                <a:spcPts val="500"/>
-              </a:spcBef>
-              <a:buFont typeface="Arial" panose="020B0604020202020204" pitchFamily="34" charset="0"/>
-              <a:buChar char="•"/>
-              <a:defRPr sz="2000" kern="1200">
-                <a:solidFill>
-                  <a:schemeClr val="tx1"/>
-                </a:solidFill>
-                <a:effectLst>
-                  <a:outerShdw blurRad="38100" dist="38100" dir="2700000" algn="tl">
-                    <a:srgbClr val="000000">
-                      <a:alpha val="43137"/>
-                    </a:srgbClr>
-                  </a:outerShdw>
-                </a:effectLst>
-                <a:latin typeface="+mn-lt"/>
-                <a:ea typeface="+mn-ea"/>
-                <a:cs typeface="+mn-cs"/>
-              </a:defRPr>
-            </a:lvl4pPr>
-            <a:lvl5pPr marL="2057400" indent="-228600" algn="l" defTabSz="914400" rtl="0" eaLnBrk="1" latinLnBrk="0" hangingPunct="1">
-              <a:lnSpc>
-                <a:spcPct val="90000"/>
-              </a:lnSpc>
-              <a:spcBef>
-                <a:spcPts val="500"/>
-              </a:spcBef>
-              <a:buFont typeface="Arial" panose="020B0604020202020204" pitchFamily="34" charset="0"/>
-              <a:buChar char="•"/>
-              <a:defRPr sz="2000" kern="1200">
-                <a:solidFill>
-                  <a:schemeClr val="tx1"/>
-                </a:solidFill>
-                <a:effectLst>
-                  <a:outerShdw blurRad="38100" dist="38100" dir="2700000" algn="tl">
-                    <a:srgbClr val="000000">
-                      <a:alpha val="43137"/>
-                    </a:srgbClr>
-                  </a:outerShdw>
-                </a:effectLst>
-                <a:latin typeface="+mn-lt"/>
-                <a:ea typeface="+mn-ea"/>
-                <a:cs typeface="+mn-cs"/>
-              </a:defRPr>
-            </a:lvl5pPr>
-            <a:lvl6pPr marL="2514600" indent="-228600" algn="l" defTabSz="914400" rtl="0" eaLnBrk="1" latinLnBrk="0" hangingPunct="1">
-              <a:lnSpc>
-                <a:spcPct val="90000"/>
-              </a:lnSpc>
-              <a:spcBef>
-                <a:spcPts val="500"/>
-              </a:spcBef>
-              <a:buFont typeface="Arial" panose="020B0604020202020204" pitchFamily="34" charset="0"/>
-              <a:buChar char="•"/>
-              <a:defRPr sz="1800" kern="1200">
-                <a:solidFill>
-                  <a:schemeClr val="tx1"/>
-                </a:solidFill>
-                <a:latin typeface="+mn-lt"/>
-                <a:ea typeface="+mn-ea"/>
-                <a:cs typeface="+mn-cs"/>
-              </a:defRPr>
-            </a:lvl6pPr>
-            <a:lvl7pPr marL="2971800" indent="-228600" algn="l" defTabSz="914400" rtl="0" eaLnBrk="1" latinLnBrk="0" hangingPunct="1">
-              <a:lnSpc>
-                <a:spcPct val="90000"/>
-              </a:lnSpc>
-              <a:spcBef>
-                <a:spcPts val="500"/>
-              </a:spcBef>
-              <a:buFont typeface="Arial" panose="020B0604020202020204" pitchFamily="34" charset="0"/>
-              <a:buChar char="•"/>
-              <a:defRPr sz="1800" kern="1200">
-                <a:solidFill>
-                  <a:schemeClr val="tx1"/>
-                </a:solidFill>
-                <a:latin typeface="+mn-lt"/>
-                <a:ea typeface="+mn-ea"/>
-                <a:cs typeface="+mn-cs"/>
-              </a:defRPr>
-            </a:lvl7pPr>
-            <a:lvl8pPr marL="3429000" indent="-228600" algn="l" defTabSz="914400" rtl="0" eaLnBrk="1" latinLnBrk="0" hangingPunct="1">
-              <a:lnSpc>
-                <a:spcPct val="90000"/>
-              </a:lnSpc>
-              <a:spcBef>
-                <a:spcPts val="500"/>
-              </a:spcBef>
-              <a:buFont typeface="Arial" panose="020B0604020202020204" pitchFamily="34" charset="0"/>
-              <a:buChar char="•"/>
-              <a:defRPr sz="1800" kern="1200">
-                <a:solidFill>
-                  <a:schemeClr val="tx1"/>
-                </a:solidFill>
-                <a:latin typeface="+mn-lt"/>
-                <a:ea typeface="+mn-ea"/>
-                <a:cs typeface="+mn-cs"/>
-              </a:defRPr>
-            </a:lvl8pPr>
-            <a:lvl9pPr marL="3886200" indent="-228600" algn="l" defTabSz="914400" rtl="0" eaLnBrk="1" latinLnBrk="0" hangingPunct="1">
-              <a:lnSpc>
-                <a:spcPct val="90000"/>
-              </a:lnSpc>
-              <a:spcBef>
-                <a:spcPts val="500"/>
-              </a:spcBef>
-              <a:buFont typeface="Arial" panose="020B0604020202020204" pitchFamily="34" charset="0"/>
-              <a:buChar char="•"/>
-              <a:defRPr sz="1800" kern="1200">
-                <a:solidFill>
-                  <a:schemeClr val="tx1"/>
-                </a:solidFill>
-                <a:latin typeface="+mn-lt"/>
-                <a:ea typeface="+mn-ea"/>
-                <a:cs typeface="+mn-cs"/>
-              </a:defRPr>
-            </a:lvl9pPr>
-          </a:lstStyle>
-          <a:p>
-            <a:pPr marL="0" indent="0">
-              <a:buNone/>
-            </a:pPr>
-            <a:r>
-              <a:rPr lang="en-US" sz="800" i="1" dirty="0">
-                <a:solidFill>
-                  <a:schemeClr val="tx1">
-                    <a:lumMod val="50000"/>
-                  </a:schemeClr>
-                </a:solidFill>
-              </a:rPr>
-              <a:t>Sources:</a:t>
-            </a:r>
           </a:p>
         </p:txBody>
       </p:sp>

</xml_diff>

<commit_message>
Fixed missing sources on large image
</commit_message>
<xml_diff>
--- a/talkgenerator/data/powerpoint/template.pptx
+++ b/talkgenerator/data/powerpoint/template.pptx
@@ -197,7 +197,7 @@
           <a:p>
             <a:fld id="{FEE386D4-E0F5-48ED-B382-C5D6AB88A5B0}" type="datetimeFigureOut">
               <a:rPr lang="en-GB" smtClean="0"/>
-              <a:t>07/03/2020</a:t>
+              <a:t>10/03/2020</a:t>
             </a:fld>
             <a:endParaRPr lang="en-GB"/>
           </a:p>
@@ -1545,10 +1545,10 @@
       </p:grpSpPr>
       <p:sp>
         <p:nvSpPr>
-          <p:cNvPr id="4" name="Picture Placeholder 2">
+          <p:cNvPr id="11" name="Picture Placeholder 2">
             <a:extLst>
               <a:ext uri="{FF2B5EF4-FFF2-40B4-BE49-F238E27FC236}">
-                <a16:creationId xmlns:a16="http://schemas.microsoft.com/office/drawing/2014/main" id="{8E6FF89B-1B2B-4A0B-8918-72D2A6956F30}"/>
+                <a16:creationId xmlns:a16="http://schemas.microsoft.com/office/drawing/2014/main" id="{80D58F11-272C-43CF-8B25-2C75EA1BA293}"/>
               </a:ext>
             </a:extLst>
           </p:cNvPr>
@@ -1556,7 +1556,7 @@
             <a:spLocks noGrp="1" noChangeAspect="1"/>
           </p:cNvSpPr>
           <p:nvPr>
-            <p:ph type="pic" idx="10"/>
+            <p:ph type="pic" idx="11"/>
           </p:nvPr>
         </p:nvSpPr>
         <p:spPr>
@@ -1612,10 +1612,10 @@
       </p:sp>
       <p:sp>
         <p:nvSpPr>
-          <p:cNvPr id="11" name="Picture Placeholder 2">
+          <p:cNvPr id="9" name="Picture Placeholder 2">
             <a:extLst>
               <a:ext uri="{FF2B5EF4-FFF2-40B4-BE49-F238E27FC236}">
-                <a16:creationId xmlns:a16="http://schemas.microsoft.com/office/drawing/2014/main" id="{80D58F11-272C-43CF-8B25-2C75EA1BA293}"/>
+                <a16:creationId xmlns:a16="http://schemas.microsoft.com/office/drawing/2014/main" id="{F9014FA8-9C84-4D12-9B40-1D543C38D993}"/>
               </a:ext>
             </a:extLst>
           </p:cNvPr>
@@ -1623,7 +1623,7 @@
             <a:spLocks noGrp="1" noChangeAspect="1"/>
           </p:cNvSpPr>
           <p:nvPr>
-            <p:ph type="pic" idx="11"/>
+            <p:ph type="pic" idx="12"/>
           </p:nvPr>
         </p:nvSpPr>
         <p:spPr>
@@ -1752,7 +1752,7 @@
           <p:cNvPr id="8" name="Content Placeholder 5">
             <a:extLst>
               <a:ext uri="{FF2B5EF4-FFF2-40B4-BE49-F238E27FC236}">
-                <a16:creationId xmlns:a16="http://schemas.microsoft.com/office/drawing/2014/main" id="{FC96F2EE-CCEF-4C3A-8D2D-F4ACC221925B}"/>
+                <a16:creationId xmlns:a16="http://schemas.microsoft.com/office/drawing/2014/main" id="{AEDCC51A-FA22-433D-A483-F845F062F281}"/>
               </a:ext>
             </a:extLst>
           </p:cNvPr>
@@ -1760,7 +1760,7 @@
             <a:spLocks noGrp="1"/>
           </p:cNvSpPr>
           <p:nvPr>
-            <p:ph sz="quarter" idx="12"/>
+            <p:ph sz="quarter" idx="10"/>
           </p:nvPr>
         </p:nvSpPr>
         <p:spPr>
@@ -5923,10 +5923,10 @@
       </p:sp>
       <p:sp>
         <p:nvSpPr>
-          <p:cNvPr id="5" name="Content Placeholder 5">
+          <p:cNvPr id="4" name="Content Placeholder 5">
             <a:extLst>
               <a:ext uri="{FF2B5EF4-FFF2-40B4-BE49-F238E27FC236}">
-                <a16:creationId xmlns:a16="http://schemas.microsoft.com/office/drawing/2014/main" id="{1C884919-5542-4C60-BEB5-79063986A13E}"/>
+                <a16:creationId xmlns:a16="http://schemas.microsoft.com/office/drawing/2014/main" id="{143611DB-F3B2-4709-81BA-AFF63265205D}"/>
               </a:ext>
             </a:extLst>
           </p:cNvPr>

</xml_diff>

<commit_message>
Added slide numbers back
</commit_message>
<xml_diff>
--- a/talkgenerator/data/powerpoint/template.pptx
+++ b/talkgenerator/data/powerpoint/template.pptx
@@ -197,7 +197,7 @@
           <a:p>
             <a:fld id="{FEE386D4-E0F5-48ED-B382-C5D6AB88A5B0}" type="datetimeFigureOut">
               <a:rPr lang="en-GB" smtClean="0"/>
-              <a:t>11/03/2020</a:t>
+              <a:t>12/03/2020</a:t>
             </a:fld>
             <a:endParaRPr lang="en-GB"/>
           </a:p>
@@ -6879,6 +6879,54 @@
           </a:p>
         </p:txBody>
       </p:sp>
+      <p:sp>
+        <p:nvSpPr>
+          <p:cNvPr id="4" name="TextBox 3">
+            <a:extLst>
+              <a:ext uri="{FF2B5EF4-FFF2-40B4-BE49-F238E27FC236}">
+                <a16:creationId xmlns:a16="http://schemas.microsoft.com/office/drawing/2014/main" id="{1CA72C0F-525C-4475-981A-934A68BA82A0}"/>
+              </a:ext>
+            </a:extLst>
+          </p:cNvPr>
+          <p:cNvSpPr txBox="1"/>
+          <p:nvPr userDrawn="1"/>
+        </p:nvSpPr>
+        <p:spPr>
+          <a:xfrm>
+            <a:off x="11840622" y="6457162"/>
+            <a:ext cx="351378" cy="261610"/>
+          </a:xfrm>
+          <a:prstGeom prst="rect">
+            <a:avLst/>
+          </a:prstGeom>
+          <a:noFill/>
+        </p:spPr>
+        <p:txBody>
+          <a:bodyPr wrap="none" rtlCol="0">
+            <a:spAutoFit/>
+          </a:bodyPr>
+          <a:lstStyle/>
+          <a:p>
+            <a:fld id="{F907D1D8-60EE-4CD5-BC0B-508EF9E5B54D}" type="slidenum">
+              <a:rPr lang="en-BE" sz="1100" smtClean="0">
+                <a:solidFill>
+                  <a:schemeClr val="tx1">
+                    <a:lumMod val="85000"/>
+                  </a:schemeClr>
+                </a:solidFill>
+              </a:rPr>
+              <a:t>‹#›</a:t>
+            </a:fld>
+            <a:endParaRPr lang="en-BE" sz="1100" dirty="0">
+              <a:solidFill>
+                <a:schemeClr val="tx1">
+                  <a:lumMod val="85000"/>
+                </a:schemeClr>
+              </a:solidFill>
+            </a:endParaRPr>
+          </a:p>
+        </p:txBody>
+      </p:sp>
     </p:spTree>
     <p:extLst>
       <p:ext uri="{BB962C8B-B14F-4D97-AF65-F5344CB8AC3E}">

</xml_diff>